<commit_message>
Changes to the report
</commit_message>
<xml_diff>
--- a/CryptoFundDueDiligence/reports/q1_2025_bitcoin_trust_fund_analysis_1 .pptx
+++ b/CryptoFundDueDiligence/reports/q1_2025_bitcoin_trust_fund_analysis_1 .pptx
@@ -5,22 +5,21 @@
     <p:sldMasterId id="2147483966" r:id="rId1"/>
   </p:sldMasterIdLst>
   <p:notesMasterIdLst>
-    <p:notesMasterId r:id="rId12"/>
+    <p:notesMasterId r:id="rId11"/>
   </p:notesMasterIdLst>
   <p:handoutMasterIdLst>
-    <p:handoutMasterId r:id="rId13"/>
+    <p:handoutMasterId r:id="rId12"/>
   </p:handoutMasterIdLst>
   <p:sldIdLst>
     <p:sldId id="259" r:id="rId2"/>
     <p:sldId id="260" r:id="rId3"/>
     <p:sldId id="261" r:id="rId4"/>
-    <p:sldId id="262" r:id="rId5"/>
-    <p:sldId id="263" r:id="rId6"/>
-    <p:sldId id="264" r:id="rId7"/>
-    <p:sldId id="265" r:id="rId8"/>
-    <p:sldId id="266" r:id="rId9"/>
-    <p:sldId id="267" r:id="rId10"/>
-    <p:sldId id="268" r:id="rId11"/>
+    <p:sldId id="263" r:id="rId5"/>
+    <p:sldId id="264" r:id="rId6"/>
+    <p:sldId id="265" r:id="rId7"/>
+    <p:sldId id="266" r:id="rId8"/>
+    <p:sldId id="267" r:id="rId9"/>
+    <p:sldId id="268" r:id="rId10"/>
   </p:sldIdLst>
   <p:sldSz cx="12192000" cy="6858000"/>
   <p:notesSz cx="6858000" cy="9144000"/>
@@ -217,8 +216,8 @@
                   <a:lstStyle/>
                   <a:p>
                     <a:r>
-                      <a:rPr lang="en-US"/>
-                      <a:t>50.0</a:t>
+                      <a:rPr lang="en-US" dirty="0"/>
+                      <a:t>50</a:t>
                     </a:r>
                   </a:p>
                 </c:rich>
@@ -233,6 +232,12 @@
               <c:showBubbleSize val="0"/>
               <c:extLst>
                 <c:ext xmlns:c15="http://schemas.microsoft.com/office/drawing/2012/chart" uri="{CE6537A1-D6FC-4f65-9D91-7224C49458BB}">
+                  <c15:layout>
+                    <c:manualLayout>
+                      <c:w val="0.18363095238095239"/>
+                      <c:h val="0.20572916666666666"/>
+                    </c:manualLayout>
+                  </c15:layout>
                   <c15:showDataLabelsRange val="0"/>
                 </c:ext>
                 <c:ext xmlns:c16="http://schemas.microsoft.com/office/drawing/2014/chart" uri="{C3380CC4-5D6E-409C-BE32-E72D297353CC}">
@@ -417,8 +422,8 @@
                   <a:lstStyle/>
                   <a:p>
                     <a:r>
-                      <a:rPr lang="en-US"/>
-                      <a:t>50.0</a:t>
+                      <a:rPr lang="en-US" dirty="0"/>
+                      <a:t>58</a:t>
                     </a:r>
                   </a:p>
                 </c:rich>
@@ -1336,7 +1341,7 @@
         <c:scaling>
           <c:orientation val="minMax"/>
         </c:scaling>
-        <c:delete val="0"/>
+        <c:delete val="1"/>
         <c:axPos val="l"/>
         <c:majorGridlines/>
         <c:numFmt formatCode="General" sourceLinked="1"/>
@@ -1452,7 +1457,7 @@
             <a:pPr rtl="0"/>
             <a:fld id="{91B8F1DB-4322-411D-BE1D-800208928B76}" type="datetime1">
               <a:rPr lang="en-US" smtClean="0"/>
-              <a:t>4/25/2025</a:t>
+              <a:t>5/15/2025</a:t>
             </a:fld>
             <a:endParaRPr lang="en-US" dirty="0"/>
           </a:p>
@@ -1622,7 +1627,7 @@
             <a:pPr rtl="0"/>
             <a:fld id="{F1FDFBCE-9522-474A-B58A-C4B46B53DA6F}" type="datetime1">
               <a:rPr lang="en-US" smtClean="0"/>
-              <a:t>4/25/2025</a:t>
+              <a:t>5/15/2025</a:t>
             </a:fld>
             <a:endParaRPr lang="en-US"/>
           </a:p>
@@ -1936,7 +1941,7 @@
             <a:pPr rtl="0"/>
             <a:fld id="{5601AA8C-C1C6-4293-BB33-7DEFE4232294}" type="datetime1">
               <a:rPr lang="en-US" smtClean="0"/>
-              <a:t>4/25/2025</a:t>
+              <a:t>5/15/2025</a:t>
             </a:fld>
             <a:endParaRPr lang="en-US" dirty="0"/>
           </a:p>
@@ -2076,7 +2081,7 @@
             <a:pPr rtl="0"/>
             <a:fld id="{B2153D3D-6C97-4D7F-B772-F372108194EF}" type="datetime1">
               <a:rPr lang="en-US" smtClean="0"/>
-              <a:t>4/25/2025</a:t>
+              <a:t>5/15/2025</a:t>
             </a:fld>
             <a:endParaRPr lang="en-US" dirty="0"/>
           </a:p>
@@ -2211,7 +2216,7 @@
             <a:pPr rtl="0"/>
             <a:fld id="{AA98EE32-EA07-47DB-A8CB-BEEA4248E79E}" type="datetime1">
               <a:rPr lang="en-US" smtClean="0"/>
-              <a:t>4/25/2025</a:t>
+              <a:t>5/15/2025</a:t>
             </a:fld>
             <a:endParaRPr lang="en-US" dirty="0"/>
           </a:p>
@@ -2346,7 +2351,7 @@
             <a:pPr rtl="0"/>
             <a:fld id="{08F3DCD7-2315-4B3C-A783-152D4A0443CE}" type="datetime1">
               <a:rPr lang="en-US" smtClean="0"/>
-              <a:t>4/25/2025</a:t>
+              <a:t>5/15/2025</a:t>
             </a:fld>
             <a:endParaRPr lang="en-US" dirty="0"/>
           </a:p>
@@ -2481,7 +2486,7 @@
             <a:pPr rtl="0"/>
             <a:fld id="{114CA0E2-3171-4709-80F4-3E7D9CEDA1F5}" type="datetime1">
               <a:rPr lang="en-US" smtClean="0"/>
-              <a:t>4/25/2025</a:t>
+              <a:t>5/15/2025</a:t>
             </a:fld>
             <a:endParaRPr lang="en-US" dirty="0"/>
           </a:p>
@@ -2608,7 +2613,7 @@
             <a:pPr rtl="0"/>
             <a:fld id="{5D2B994F-6814-42FC-A99F-20C3AC32CA91}" type="datetime1">
               <a:rPr lang="en-US" smtClean="0"/>
-              <a:t>4/25/2025</a:t>
+              <a:t>5/15/2025</a:t>
             </a:fld>
             <a:endParaRPr lang="en-US" dirty="0"/>
           </a:p>
@@ -2737,7 +2742,7 @@
             <a:pPr rtl="0"/>
             <a:fld id="{5FE6B8DD-2C22-484C-9134-B065A54C675C}" type="datetime1">
               <a:rPr lang="en-US" smtClean="0"/>
-              <a:t>4/25/2025</a:t>
+              <a:t>5/15/2025</a:t>
             </a:fld>
             <a:endParaRPr lang="en-US" dirty="0"/>
           </a:p>
@@ -2835,7 +2840,7 @@
             <a:pPr rtl="0"/>
             <a:fld id="{5601AA8C-C1C6-4293-BB33-7DEFE4232294}" type="datetime1">
               <a:rPr lang="en-US" smtClean="0"/>
-              <a:t>4/25/2025</a:t>
+              <a:t>5/15/2025</a:t>
             </a:fld>
             <a:endParaRPr lang="en-US" dirty="0"/>
           </a:p>
@@ -2934,7 +2939,7 @@
             <a:pPr rtl="0"/>
             <a:fld id="{5601AA8C-C1C6-4293-BB33-7DEFE4232294}" type="datetime1">
               <a:rPr lang="en-US" smtClean="0"/>
-              <a:t>4/25/2025</a:t>
+              <a:t>5/15/2025</a:t>
             </a:fld>
             <a:endParaRPr lang="en-US" dirty="0"/>
           </a:p>
@@ -3033,7 +3038,7 @@
             <a:pPr rtl="0"/>
             <a:fld id="{5601AA8C-C1C6-4293-BB33-7DEFE4232294}" type="datetime1">
               <a:rPr lang="en-US" smtClean="0"/>
-              <a:t>4/25/2025</a:t>
+              <a:t>5/15/2025</a:t>
             </a:fld>
             <a:endParaRPr lang="en-US" dirty="0"/>
           </a:p>
@@ -3132,7 +3137,7 @@
             <a:pPr rtl="0"/>
             <a:fld id="{5601AA8C-C1C6-4293-BB33-7DEFE4232294}" type="datetime1">
               <a:rPr lang="en-US" smtClean="0"/>
-              <a:t>4/25/2025</a:t>
+              <a:t>5/15/2025</a:t>
             </a:fld>
             <a:endParaRPr lang="en-US" dirty="0"/>
           </a:p>
@@ -3237,7 +3242,7 @@
             <a:pPr rtl="0"/>
             <a:fld id="{5601AA8C-C1C6-4293-BB33-7DEFE4232294}" type="datetime1">
               <a:rPr lang="en-US" smtClean="0"/>
-              <a:t>4/25/2025</a:t>
+              <a:t>5/15/2025</a:t>
             </a:fld>
             <a:endParaRPr lang="en-US" dirty="0"/>
           </a:p>
@@ -3382,7 +3387,7 @@
             <a:pPr rtl="0"/>
             <a:fld id="{5601AA8C-C1C6-4293-BB33-7DEFE4232294}" type="datetime1">
               <a:rPr lang="en-US" smtClean="0"/>
-              <a:t>4/25/2025</a:t>
+              <a:t>5/15/2025</a:t>
             </a:fld>
             <a:endParaRPr lang="en-US" dirty="0"/>
           </a:p>
@@ -3481,7 +3486,7 @@
             <a:pPr rtl="0"/>
             <a:fld id="{5601AA8C-C1C6-4293-BB33-7DEFE4232294}" type="datetime1">
               <a:rPr lang="en-US" smtClean="0"/>
-              <a:t>4/25/2025</a:t>
+              <a:t>5/15/2025</a:t>
             </a:fld>
             <a:endParaRPr lang="en-US" dirty="0"/>
           </a:p>
@@ -3580,7 +3585,7 @@
             <a:pPr rtl="0"/>
             <a:fld id="{668ACE20-7520-4CBD-AF10-4181E484D505}" type="datetime1">
               <a:rPr lang="en-US" smtClean="0"/>
-              <a:t>4/25/2025</a:t>
+              <a:t>5/15/2025</a:t>
             </a:fld>
             <a:endParaRPr lang="en-US" dirty="0"/>
           </a:p>
@@ -3678,7 +3683,7 @@
             <a:pPr rtl="0"/>
             <a:fld id="{C7010D17-85D8-40AF-A827-D3D53BD21CF7}" type="datetime1">
               <a:rPr lang="en-US" smtClean="0"/>
-              <a:t>4/25/2025</a:t>
+              <a:t>5/15/2025</a:t>
             </a:fld>
             <a:endParaRPr lang="en-US" dirty="0"/>
           </a:p>
@@ -3782,7 +3787,7 @@
             <a:pPr rtl="0"/>
             <a:fld id="{5601AA8C-C1C6-4293-BB33-7DEFE4232294}" type="datetime1">
               <a:rPr lang="en-US" smtClean="0"/>
-              <a:t>4/25/2025</a:t>
+              <a:t>5/15/2025</a:t>
             </a:fld>
             <a:endParaRPr lang="en-US" dirty="0"/>
           </a:p>
@@ -3928,7 +3933,7 @@
             <a:pPr rtl="0"/>
             <a:fld id="{5601AA8C-C1C6-4293-BB33-7DEFE4232294}" type="datetime1">
               <a:rPr lang="en-US" smtClean="0"/>
-              <a:t>4/25/2025</a:t>
+              <a:t>5/15/2025</a:t>
             </a:fld>
             <a:endParaRPr lang="en-US" dirty="0"/>
           </a:p>
@@ -4074,7 +4079,7 @@
             <a:pPr rtl="0"/>
             <a:fld id="{5601AA8C-C1C6-4293-BB33-7DEFE4232294}" type="datetime1">
               <a:rPr lang="en-US" smtClean="0"/>
-              <a:t>4/25/2025</a:t>
+              <a:t>5/15/2025</a:t>
             </a:fld>
             <a:endParaRPr lang="en-US" dirty="0"/>
           </a:p>
@@ -4249,7 +4254,7 @@
             <a:pPr rtl="0"/>
             <a:fld id="{5601AA8C-C1C6-4293-BB33-7DEFE4232294}" type="datetime1">
               <a:rPr lang="en-US" smtClean="0"/>
-              <a:t>4/25/2025</a:t>
+              <a:t>5/15/2025</a:t>
             </a:fld>
             <a:endParaRPr lang="en-US" dirty="0"/>
           </a:p>
@@ -4366,7 +4371,7 @@
             <a:pPr rtl="0"/>
             <a:fld id="{BAFE2A55-4918-4B78-B4C1-223F7257E9CD}" type="datetime1">
               <a:rPr lang="en-US" smtClean="0"/>
-              <a:t>4/25/2025</a:t>
+              <a:t>5/15/2025</a:t>
             </a:fld>
             <a:endParaRPr lang="en-US" dirty="0"/>
           </a:p>
@@ -4511,7 +4516,7 @@
             <a:pPr rtl="0"/>
             <a:fld id="{5601AA8C-C1C6-4293-BB33-7DEFE4232294}" type="datetime1">
               <a:rPr lang="en-US" smtClean="0"/>
-              <a:t>4/25/2025</a:t>
+              <a:t>5/15/2025</a:t>
             </a:fld>
             <a:endParaRPr lang="en-US" dirty="0"/>
           </a:p>
@@ -4651,7 +4656,7 @@
             <a:pPr rtl="0"/>
             <a:fld id="{5EAE40C9-D0BC-431E-94CA-3A0AFB9CF2DC}" type="datetime1">
               <a:rPr lang="en-US" smtClean="0"/>
-              <a:t>4/25/2025</a:t>
+              <a:t>5/15/2025</a:t>
             </a:fld>
             <a:endParaRPr lang="en-US" dirty="0"/>
           </a:p>
@@ -4846,7 +4851,7 @@
             <a:pPr rtl="0"/>
             <a:fld id="{5601AA8C-C1C6-4293-BB33-7DEFE4232294}" type="datetime1">
               <a:rPr lang="en-US" smtClean="0"/>
-              <a:t>4/25/2025</a:t>
+              <a:t>5/15/2025</a:t>
             </a:fld>
             <a:endParaRPr lang="en-US" dirty="0"/>
           </a:p>
@@ -5312,8 +5317,10 @@
               </a:defRPr>
             </a:pPr>
             <a:r>
-              <a:t>Bitcoin Momentum Opportunities Fund Due Diligence Report</a:t>
+              <a:rPr lang="en-GB" dirty="0"/>
+              <a:t>q1_2025_bitcoin_trust_fund_analysis_1 </a:t>
             </a:r>
+            <a:endParaRPr dirty="0"/>
           </a:p>
         </p:txBody>
       </p:sp>
@@ -5348,6 +5355,7 @@
               </a:defRPr>
             </a:pPr>
             <a:r>
+              <a:rPr dirty="0"/>
               <a:t>Comprehensive Analysis &amp; Risk Assessment</a:t>
             </a:r>
           </a:p>
@@ -5362,7 +5370,7 @@
         <p:spPr>
           <a:xfrm>
             <a:off x="457200" y="6172200"/>
-            <a:ext cx="3657600" cy="457200"/>
+            <a:ext cx="3657600" cy="261610"/>
           </a:xfrm>
           <a:prstGeom prst="rect">
             <a:avLst/>
@@ -5384,138 +5392,12 @@
               </a:defRPr>
             </a:pPr>
             <a:r>
-              <a:t>April 25, 2025</a:t>
-            </a:r>
-          </a:p>
-        </p:txBody>
-      </p:sp>
-    </p:spTree>
-  </p:cSld>
-  <p:clrMapOvr>
-    <a:masterClrMapping/>
-  </p:clrMapOvr>
-</p:sld>
-</file>
-
-<file path=ppt/slides/slide10.xml><?xml version="1.0" encoding="utf-8"?>
-<p:sld xmlns:a="http://schemas.openxmlformats.org/drawingml/2006/main" xmlns:r="http://schemas.openxmlformats.org/officeDocument/2006/relationships" xmlns:p="http://schemas.openxmlformats.org/presentationml/2006/main">
-  <p:cSld>
-    <p:spTree>
-      <p:nvGrpSpPr>
-        <p:cNvPr id="1" name=""/>
-        <p:cNvGrpSpPr/>
-        <p:nvPr/>
-      </p:nvGrpSpPr>
-      <p:grpSpPr>
-        <a:xfrm>
-          <a:off x="0" y="0"/>
-          <a:ext cx="0" cy="0"/>
-          <a:chOff x="0" y="0"/>
-          <a:chExt cx="0" cy="0"/>
-        </a:xfrm>
-      </p:grpSpPr>
-      <p:sp>
-        <p:nvSpPr>
-          <p:cNvPr id="2" name="Title 1"/>
-          <p:cNvSpPr>
-            <a:spLocks noGrp="1"/>
-          </p:cNvSpPr>
-          <p:nvPr>
-            <p:ph type="title"/>
-          </p:nvPr>
-        </p:nvSpPr>
-        <p:spPr/>
-        <p:txBody>
-          <a:bodyPr wrap="square" anchor="t"/>
-          <a:lstStyle/>
-          <a:p>
-            <a:pPr>
-              <a:defRPr sz="3200" b="1">
-                <a:solidFill>
-                  <a:srgbClr val="333333"/>
-                </a:solidFill>
-              </a:defRPr>
-            </a:pPr>
-            <a:r>
-              <a:t>Conclusion &amp; Overall Assessment</a:t>
-            </a:r>
-          </a:p>
-        </p:txBody>
-      </p:sp>
-      <p:sp>
-        <p:nvSpPr>
-          <p:cNvPr id="3" name="TextBox 2"/>
-          <p:cNvSpPr txBox="1"/>
-          <p:nvPr/>
-        </p:nvSpPr>
-        <p:spPr>
-          <a:xfrm>
-            <a:off x="457200" y="1188720"/>
-            <a:ext cx="5486400" cy="5212080"/>
-          </a:xfrm>
-          <a:prstGeom prst="rect">
-            <a:avLst/>
-          </a:prstGeom>
-          <a:noFill/>
-        </p:spPr>
-        <p:txBody>
-          <a:bodyPr wrap="square" anchor="t">
-            <a:spAutoFit/>
-          </a:bodyPr>
-          <a:lstStyle/>
-          <a:p>
-            <a:pPr>
-              <a:defRPr sz="1200">
-                <a:solidFill>
-                  <a:srgbClr val="333333"/>
-                </a:solidFill>
-                <a:latin typeface="Segoe UI"/>
-              </a:defRPr>
-            </a:pPr>
-            <a:endParaRPr dirty="0"/>
-          </a:p>
-          <a:p>
-            <a:pPr>
-              <a:spcAft>
-                <a:spcPts val="600"/>
-              </a:spcAft>
-              <a:defRPr sz="1600" b="1"/>
-            </a:pPr>
-            <a:r>
-              <a:rPr dirty="0"/>
-              <a:t>Overall Assessment: N/A</a:t>
-            </a:r>
-          </a:p>
-          <a:p>
-            <a:pPr>
-              <a:spcAft>
-                <a:spcPts val="1200"/>
-              </a:spcAft>
-              <a:defRPr sz="1200"/>
-            </a:pPr>
-            <a:r>
-              <a:rPr dirty="0"/>
-              <a:t>The Bitcoin Momentum Opportunities Fund presents a medium risk level and partial compliance level. Its most significant strength is its clear and concentrated investment strategy, while its most significant concern is the high portfolio asset concentration. The fund's overall profile raises caution due to significant regulatory gaps and high-risk factors. In conclusion, the Bitcoin Momentum Opportunities Fund requires caution, as its specialized approach and defined risk level are offset by notable concerns regarding asset concentration and incomplete regulatory registrations.</a:t>
-            </a:r>
-          </a:p>
-          <a:p>
-            <a:pPr>
-              <a:spcAft>
-                <a:spcPts val="400"/>
-              </a:spcAft>
-              <a:defRPr sz="1200"/>
-            </a:pPr>
-            <a:r>
-              <a:rPr b="1" dirty="0">
-                <a:solidFill>
-                  <a:srgbClr val="FFCC00"/>
-                </a:solidFill>
-              </a:rPr>
-              <a:t>Risk: Medium (50.0)</a:t>
+              <a:rPr lang="fr-FR" dirty="0"/>
+              <a:t>May  15/</a:t>
             </a:r>
             <a:r>
               <a:rPr dirty="0"/>
-              <a:t>  |  </a:t>
+              <a:t>2025</a:t>
             </a:r>
           </a:p>
         </p:txBody>
@@ -5573,74 +5455,22 @@
           </a:p>
         </p:txBody>
       </p:sp>
-      <p:sp>
-        <p:nvSpPr>
-          <p:cNvPr id="3" name="TextBox 2"/>
-          <p:cNvSpPr txBox="1"/>
-          <p:nvPr/>
-        </p:nvSpPr>
-        <p:spPr>
-          <a:xfrm>
-            <a:off x="457200" y="1188720"/>
-            <a:ext cx="5486400" cy="1371600"/>
-          </a:xfrm>
-          <a:prstGeom prst="rect">
-            <a:avLst/>
-          </a:prstGeom>
-          <a:noFill/>
-        </p:spPr>
-        <p:txBody>
-          <a:bodyPr wrap="square" anchor="t">
-            <a:spAutoFit/>
-          </a:bodyPr>
-          <a:lstStyle/>
-          <a:p>
-            <a:pPr>
-              <a:defRPr sz="1200">
-                <a:solidFill>
-                  <a:srgbClr val="333333"/>
-                </a:solidFill>
-                <a:latin typeface="Segoe UI"/>
-              </a:defRPr>
-            </a:pPr>
-            <a:endParaRPr/>
-          </a:p>
-          <a:p>
-            <a:pPr>
-              <a:defRPr sz="1400" b="1"/>
-            </a:pPr>
-            <a:r>
-              <a:t>Fund: N/A</a:t>
-            </a:r>
-          </a:p>
-          <a:p>
-            <a:pPr>
-              <a:defRPr sz="1200"/>
-            </a:pPr>
-            <a:r>
-              <a:t>AUM: $0.00M</a:t>
-            </a:r>
-          </a:p>
-          <a:p>
-            <a:pPr>
-              <a:defRPr sz="1200"/>
-            </a:pPr>
-            <a:r>
-              <a:t>Strategy: N/A</a:t>
-            </a:r>
-          </a:p>
-        </p:txBody>
-      </p:sp>
       <p:graphicFrame>
         <p:nvGraphicFramePr>
           <p:cNvPr id="4" name="Chart 3"/>
           <p:cNvGraphicFramePr>
             <a:graphicFrameLocks noGrp="1"/>
           </p:cNvGraphicFramePr>
-          <p:nvPr/>
+          <p:nvPr>
+            <p:extLst>
+              <p:ext uri="{D42A27DB-BD31-4B8C-83A1-F6EECF244321}">
+                <p14:modId xmlns:p14="http://schemas.microsoft.com/office/powerpoint/2010/main" val="239517802"/>
+              </p:ext>
+            </p:extLst>
+          </p:nvPr>
         </p:nvGraphicFramePr>
         <p:xfrm>
-          <a:off x="457200" y="2743200"/>
+          <a:off x="373224" y="1924397"/>
           <a:ext cx="2560320" cy="1463040"/>
         </p:xfrm>
         <a:graphic>
@@ -5655,10 +5485,16 @@
           <p:cNvGraphicFramePr>
             <a:graphicFrameLocks noGrp="1"/>
           </p:cNvGraphicFramePr>
-          <p:nvPr/>
+          <p:nvPr>
+            <p:extLst>
+              <p:ext uri="{D42A27DB-BD31-4B8C-83A1-F6EECF244321}">
+                <p14:modId xmlns:p14="http://schemas.microsoft.com/office/powerpoint/2010/main" val="336260132"/>
+              </p:ext>
+            </p:extLst>
+          </p:nvPr>
         </p:nvGraphicFramePr>
         <p:xfrm>
-          <a:off x="3200400" y="2743200"/>
+          <a:off x="3116424" y="1924397"/>
           <a:ext cx="2560320" cy="1463040"/>
         </p:xfrm>
         <a:graphic>
@@ -5675,8 +5511,8 @@
         </p:nvSpPr>
         <p:spPr>
           <a:xfrm>
-            <a:off x="457200" y="4389120"/>
-            <a:ext cx="5486400" cy="2011680"/>
+            <a:off x="457200" y="4076023"/>
+            <a:ext cx="5486400" cy="2400657"/>
           </a:xfrm>
           <a:prstGeom prst="rect">
             <a:avLst/>
@@ -5697,7 +5533,7 @@
                 <a:latin typeface="Segoe UI"/>
               </a:defRPr>
             </a:pPr>
-            <a:endParaRPr/>
+            <a:endParaRPr sz="1400" dirty="0"/>
           </a:p>
           <a:p>
             <a:pPr>
@@ -5711,6 +5547,7 @@
               </a:defRPr>
             </a:pPr>
             <a:r>
+              <a:rPr sz="1400" dirty="0"/>
               <a:t>Key Strengths</a:t>
             </a:r>
           </a:p>
@@ -5726,6 +5563,7 @@
               </a:defRPr>
             </a:pPr>
             <a:r>
+              <a:rPr sz="1400" dirty="0"/>
               <a:t>The fund has a clear focus with its top holding percentage being 100%, indicating a concentrated investment strategy.</a:t>
             </a:r>
           </a:p>
@@ -5741,6 +5579,7 @@
               </a:defRPr>
             </a:pPr>
             <a:r>
+              <a:rPr sz="1400" dirty="0"/>
               <a:t>The fund's name, Bitcoin Momentum Opportunities Fund, suggests a specialized approach which could be a strength in terms of focus and expertise.</a:t>
             </a:r>
           </a:p>
@@ -5756,6 +5595,7 @@
               </a:defRPr>
             </a:pPr>
             <a:r>
+              <a:rPr sz="1400" dirty="0"/>
               <a:t>The fund has a defined risk level of Medium, which might indicate a balanced approach to investment, though this is somewhat mitigated by other concerns.</a:t>
             </a:r>
           </a:p>
@@ -5769,8 +5609,8 @@
         </p:nvSpPr>
         <p:spPr>
           <a:xfrm>
-            <a:off x="6400800" y="1188720"/>
-            <a:ext cx="5334000" cy="3200400"/>
+            <a:off x="6400800" y="458956"/>
+            <a:ext cx="5334000" cy="2970044"/>
           </a:xfrm>
           <a:prstGeom prst="rect">
             <a:avLst/>
@@ -5791,7 +5631,7 @@
                 <a:latin typeface="Segoe UI"/>
               </a:defRPr>
             </a:pPr>
-            <a:endParaRPr/>
+            <a:endParaRPr sz="1400" dirty="0"/>
           </a:p>
           <a:p>
             <a:pPr>
@@ -5805,6 +5645,7 @@
               </a:defRPr>
             </a:pPr>
             <a:r>
+              <a:rPr sz="1400" dirty="0"/>
               <a:t>Summary Assessment</a:t>
             </a:r>
           </a:p>
@@ -5813,10 +5654,14 @@
               <a:defRPr sz="1200"/>
             </a:pPr>
             <a:r>
+              <a:rPr sz="1400" dirty="0"/>
               <a:t>Executive Summary: </a:t>
             </a:r>
-            <a:br/>
+            <a:br>
+              <a:rPr sz="1400" dirty="0"/>
+            </a:br>
             <a:r>
+              <a:rPr sz="1400" dirty="0"/>
               <a:t>The Bitcoin Momentum Opportunities Fund, with an AUM of 218.7, employs a long-term Bitcoin ecosystem investment strategy with selective exposure to Bitcoin ETFs and derivatives. Our analysis indicates a Medium overall risk level with a score of 52.59. The fund's overall compliance level is Partial, scoring 44.83. Key strengths include the fund's clear focus and specialized approach, as suggested by its name and concentrated investment strategy. However, concerns arise from the high portfolio asset concentration and incomplete regulatory registrations in key jurisdictions, such as Singapore and the US, posing significant risks to the fund's operational viability and reputation.</a:t>
             </a:r>
           </a:p>
@@ -5830,8 +5675,8 @@
         </p:nvSpPr>
         <p:spPr>
           <a:xfrm>
-            <a:off x="6400800" y="4572000"/>
-            <a:ext cx="5334000" cy="1828800"/>
+            <a:off x="6400800" y="3881535"/>
+            <a:ext cx="5334000" cy="2400657"/>
           </a:xfrm>
           <a:prstGeom prst="rect">
             <a:avLst/>
@@ -5852,7 +5697,7 @@
                 <a:latin typeface="Segoe UI"/>
               </a:defRPr>
             </a:pPr>
-            <a:endParaRPr/>
+            <a:endParaRPr sz="1400" dirty="0"/>
           </a:p>
           <a:p>
             <a:pPr>
@@ -5866,6 +5711,7 @@
               </a:defRPr>
             </a:pPr>
             <a:r>
+              <a:rPr sz="1400" dirty="0"/>
               <a:t>Key Concerns</a:t>
             </a:r>
           </a:p>
@@ -5881,6 +5727,7 @@
               </a:defRPr>
             </a:pPr>
             <a:r>
+              <a:rPr sz="1400" dirty="0"/>
               <a:t>High portfolio asset concentration is listed as a very high-risk factor, indicating potential vulnerability to market fluctuations of a single asset.</a:t>
             </a:r>
           </a:p>
@@ -5896,6 +5743,7 @@
               </a:defRPr>
             </a:pPr>
             <a:r>
+              <a:rPr sz="1400" dirty="0"/>
               <a:t>The overall compliance score is 44.833333333333336 with a compliance level of Partial, highlighting significant regulatory gaps.</a:t>
             </a:r>
           </a:p>
@@ -5911,6 +5759,7 @@
               </a:defRPr>
             </a:pPr>
             <a:r>
+              <a:rPr sz="1400" dirty="0"/>
               <a:t>Incomplete regulatory registrations in key jurisdictions like Singapore and the US pose a significant risk to the fund's operational viability and reputation.</a:t>
             </a:r>
           </a:p>
@@ -5975,20 +5824,26 @@
           <p:cNvGraphicFramePr>
             <a:graphicFrameLocks noGrp="1"/>
           </p:cNvGraphicFramePr>
-          <p:nvPr/>
+          <p:nvPr>
+            <p:extLst>
+              <p:ext uri="{D42A27DB-BD31-4B8C-83A1-F6EECF244321}">
+                <p14:modId xmlns:p14="http://schemas.microsoft.com/office/powerpoint/2010/main" val="509561821"/>
+              </p:ext>
+            </p:extLst>
+          </p:nvPr>
         </p:nvGraphicFramePr>
         <p:xfrm>
           <a:off x="457200" y="1188720"/>
-          <a:ext cx="5029200" cy="4228008"/>
+          <a:ext cx="4194493" cy="4828900"/>
         </p:xfrm>
         <a:graphic>
           <a:graphicData uri="http://schemas.openxmlformats.org/drawingml/2006/table">
             <a:tbl>
               <a:tblPr firstRow="1" bandRow="1">
-                <a:tableStyleId>{5C22544A-7EE6-4342-B048-85BDC9FD1C3A}</a:tableStyleId>
+                <a:tableStyleId>{21E4AEA4-8DFA-4A89-87EB-49C32662AFE0}</a:tableStyleId>
               </a:tblPr>
               <a:tblGrid>
-                <a:gridCol w="2514600">
+                <a:gridCol w="1679893">
                   <a:extLst>
                     <a:ext uri="{9D8B030D-6E8A-4147-A177-3AD203B41FA5}">
                       <a16:colId xmlns:a16="http://schemas.microsoft.com/office/drawing/2014/main" val="20000"/>
@@ -6018,13 +5873,19 @@
                         </a:defRPr>
                       </a:pPr>
                       <a:r>
+                        <a:rPr sz="1400" dirty="0">
+                          <a:solidFill>
+                            <a:schemeClr val="tx1">
+                              <a:lumMod val="95000"/>
+                              <a:lumOff val="5000"/>
+                            </a:schemeClr>
+                          </a:solidFill>
+                        </a:rPr>
                         <a:t>Aum</a:t>
                       </a:r>
                     </a:p>
                   </a:txBody>
-                  <a:tcPr>
-                    <a:noFill/>
-                  </a:tcPr>
+                  <a:tcPr/>
                 </a:tc>
                 <a:tc>
                   <a:txBody>
@@ -6040,13 +5901,19 @@
                         </a:defRPr>
                       </a:pPr>
                       <a:r>
+                        <a:rPr sz="1400" dirty="0">
+                          <a:solidFill>
+                            <a:schemeClr val="tx1">
+                              <a:lumMod val="95000"/>
+                              <a:lumOff val="5000"/>
+                            </a:schemeClr>
+                          </a:solidFill>
+                        </a:rPr>
                         <a:t>218.7</a:t>
                       </a:r>
                     </a:p>
                   </a:txBody>
-                  <a:tcPr>
-                    <a:noFill/>
-                  </a:tcPr>
+                  <a:tcPr/>
                 </a:tc>
                 <a:extLst>
                   <a:ext uri="{0D108BD9-81ED-4DB2-BD59-A6C34878D82A}">
@@ -6069,15 +5936,19 @@
                         </a:defRPr>
                       </a:pPr>
                       <a:r>
+                        <a:rPr sz="1400" dirty="0">
+                          <a:solidFill>
+                            <a:schemeClr val="tx1">
+                              <a:lumMod val="95000"/>
+                              <a:lumOff val="5000"/>
+                            </a:schemeClr>
+                          </a:solidFill>
+                        </a:rPr>
                         <a:t>Management Fee</a:t>
                       </a:r>
                     </a:p>
                   </a:txBody>
-                  <a:tcPr>
-                    <a:solidFill>
-                      <a:srgbClr val="F5F5FA"/>
-                    </a:solidFill>
-                  </a:tcPr>
+                  <a:tcPr/>
                 </a:tc>
                 <a:tc>
                   <a:txBody>
@@ -6093,15 +5964,19 @@
                         </a:defRPr>
                       </a:pPr>
                       <a:r>
+                        <a:rPr sz="1400" dirty="0">
+                          <a:solidFill>
+                            <a:schemeClr val="tx1">
+                              <a:lumMod val="95000"/>
+                              <a:lumOff val="5000"/>
+                            </a:schemeClr>
+                          </a:solidFill>
+                        </a:rPr>
                         <a:t>2.2</a:t>
                       </a:r>
                     </a:p>
                   </a:txBody>
-                  <a:tcPr>
-                    <a:solidFill>
-                      <a:srgbClr val="F5F5FA"/>
-                    </a:solidFill>
-                  </a:tcPr>
+                  <a:tcPr/>
                 </a:tc>
                 <a:extLst>
                   <a:ext uri="{0D108BD9-81ED-4DB2-BD59-A6C34878D82A}">
@@ -6124,13 +5999,19 @@
                         </a:defRPr>
                       </a:pPr>
                       <a:r>
+                        <a:rPr sz="1400">
+                          <a:solidFill>
+                            <a:schemeClr val="tx1">
+                              <a:lumMod val="95000"/>
+                              <a:lumOff val="5000"/>
+                            </a:schemeClr>
+                          </a:solidFill>
+                        </a:rPr>
                         <a:t>Performance Fee</a:t>
                       </a:r>
                     </a:p>
                   </a:txBody>
-                  <a:tcPr>
-                    <a:noFill/>
-                  </a:tcPr>
+                  <a:tcPr/>
                 </a:tc>
                 <a:tc>
                   <a:txBody>
@@ -6146,13 +6027,19 @@
                         </a:defRPr>
                       </a:pPr>
                       <a:r>
+                        <a:rPr sz="1400" dirty="0">
+                          <a:solidFill>
+                            <a:schemeClr val="tx1">
+                              <a:lumMod val="95000"/>
+                              <a:lumOff val="5000"/>
+                            </a:schemeClr>
+                          </a:solidFill>
+                        </a:rPr>
                         <a:t>20.0</a:t>
                       </a:r>
                     </a:p>
                   </a:txBody>
-                  <a:tcPr>
-                    <a:noFill/>
-                  </a:tcPr>
+                  <a:tcPr/>
                 </a:tc>
                 <a:extLst>
                   <a:ext uri="{0D108BD9-81ED-4DB2-BD59-A6C34878D82A}">
@@ -6175,15 +6062,19 @@
                         </a:defRPr>
                       </a:pPr>
                       <a:r>
+                        <a:rPr sz="1400">
+                          <a:solidFill>
+                            <a:schemeClr val="tx1">
+                              <a:lumMod val="95000"/>
+                              <a:lumOff val="5000"/>
+                            </a:schemeClr>
+                          </a:solidFill>
+                        </a:rPr>
                         <a:t>Launch Date</a:t>
                       </a:r>
                     </a:p>
                   </a:txBody>
-                  <a:tcPr>
-                    <a:solidFill>
-                      <a:srgbClr val="F5F5FA"/>
-                    </a:solidFill>
-                  </a:tcPr>
+                  <a:tcPr/>
                 </a:tc>
                 <a:tc>
                   <a:txBody>
@@ -6199,15 +6090,19 @@
                         </a:defRPr>
                       </a:pPr>
                       <a:r>
+                        <a:rPr sz="1400" dirty="0">
+                          <a:solidFill>
+                            <a:schemeClr val="tx1">
+                              <a:lumMod val="95000"/>
+                              <a:lumOff val="5000"/>
+                            </a:schemeClr>
+                          </a:solidFill>
+                        </a:rPr>
                         <a:t>January 10, 2024</a:t>
                       </a:r>
                     </a:p>
                   </a:txBody>
-                  <a:tcPr>
-                    <a:solidFill>
-                      <a:srgbClr val="F5F5FA"/>
-                    </a:solidFill>
-                  </a:tcPr>
+                  <a:tcPr/>
                 </a:tc>
                 <a:extLst>
                   <a:ext uri="{0D108BD9-81ED-4DB2-BD59-A6C34878D82A}">
@@ -6230,13 +6125,19 @@
                         </a:defRPr>
                       </a:pPr>
                       <a:r>
+                        <a:rPr sz="1400">
+                          <a:solidFill>
+                            <a:schemeClr val="tx1">
+                              <a:lumMod val="95000"/>
+                              <a:lumOff val="5000"/>
+                            </a:schemeClr>
+                          </a:solidFill>
+                        </a:rPr>
                         <a:t>Min Investment</a:t>
                       </a:r>
                     </a:p>
                   </a:txBody>
-                  <a:tcPr>
-                    <a:noFill/>
-                  </a:tcPr>
+                  <a:tcPr/>
                 </a:tc>
                 <a:tc>
                   <a:txBody>
@@ -6252,13 +6153,19 @@
                         </a:defRPr>
                       </a:pPr>
                       <a:r>
+                        <a:rPr sz="1400" dirty="0">
+                          <a:solidFill>
+                            <a:schemeClr val="tx1">
+                              <a:lumMod val="95000"/>
+                              <a:lumOff val="5000"/>
+                            </a:schemeClr>
+                          </a:solidFill>
+                        </a:rPr>
                         <a:t>2 BTC or equivalent ($185,000)</a:t>
                       </a:r>
                     </a:p>
                   </a:txBody>
-                  <a:tcPr>
-                    <a:noFill/>
-                  </a:tcPr>
+                  <a:tcPr/>
                 </a:tc>
                 <a:extLst>
                   <a:ext uri="{0D108BD9-81ED-4DB2-BD59-A6C34878D82A}">
@@ -6281,15 +6188,19 @@
                         </a:defRPr>
                       </a:pPr>
                       <a:r>
+                        <a:rPr sz="1400">
+                          <a:solidFill>
+                            <a:schemeClr val="tx1">
+                              <a:lumMod val="95000"/>
+                              <a:lumOff val="5000"/>
+                            </a:schemeClr>
+                          </a:solidFill>
+                        </a:rPr>
                         <a:t>Lock Up</a:t>
                       </a:r>
                     </a:p>
                   </a:txBody>
-                  <a:tcPr>
-                    <a:solidFill>
-                      <a:srgbClr val="F5F5FA"/>
-                    </a:solidFill>
-                  </a:tcPr>
+                  <a:tcPr/>
                 </a:tc>
                 <a:tc>
                   <a:txBody>
@@ -6305,15 +6216,19 @@
                         </a:defRPr>
                       </a:pPr>
                       <a:r>
+                        <a:rPr sz="1400" dirty="0">
+                          <a:solidFill>
+                            <a:schemeClr val="tx1">
+                              <a:lumMod val="95000"/>
+                              <a:lumOff val="5000"/>
+                            </a:schemeClr>
+                          </a:solidFill>
+                        </a:rPr>
                         <a:t>Period: 6 months with quarterly redemptions thereafter</a:t>
                       </a:r>
                     </a:p>
                   </a:txBody>
-                  <a:tcPr>
-                    <a:solidFill>
-                      <a:srgbClr val="F5F5FA"/>
-                    </a:solidFill>
-                  </a:tcPr>
+                  <a:tcPr/>
                 </a:tc>
                 <a:extLst>
                   <a:ext uri="{0D108BD9-81ED-4DB2-BD59-A6C34878D82A}">
@@ -6336,13 +6251,19 @@
                         </a:defRPr>
                       </a:pPr>
                       <a:r>
+                        <a:rPr sz="1400" dirty="0">
+                          <a:solidFill>
+                            <a:schemeClr val="tx1">
+                              <a:lumMod val="95000"/>
+                              <a:lumOff val="5000"/>
+                            </a:schemeClr>
+                          </a:solidFill>
+                        </a:rPr>
                         <a:t>Security Features</a:t>
                       </a:r>
                     </a:p>
                   </a:txBody>
-                  <a:tcPr>
-                    <a:noFill/>
-                  </a:tcPr>
+                  <a:tcPr/>
                 </a:tc>
                 <a:tc>
                   <a:txBody>
@@ -6358,13 +6279,19 @@
                         </a:defRPr>
                       </a:pPr>
                       <a:r>
+                        <a:rPr sz="1400" dirty="0">
+                          <a:solidFill>
+                            <a:schemeClr val="tx1">
+                              <a:lumMod val="95000"/>
+                              <a:lumOff val="5000"/>
+                            </a:schemeClr>
+                          </a:solidFill>
+                        </a:rPr>
                         <a:t>Cold Storage 0x00000000219ab540356cBB839Cbe05303d7705Fa 606 BTC Multi-sig (5-of-7), Hardware</a:t>
                       </a:r>
                     </a:p>
                   </a:txBody>
-                  <a:tcPr>
-                    <a:noFill/>
-                  </a:tcPr>
+                  <a:tcPr/>
                 </a:tc>
                 <a:extLst>
                   <a:ext uri="{0D108BD9-81ED-4DB2-BD59-A6C34878D82A}">
@@ -6385,7 +6312,7 @@
         <p:spPr>
           <a:xfrm>
             <a:off x="5852160" y="1188720"/>
-            <a:ext cx="5882640" cy="4114800"/>
+            <a:ext cx="5882640" cy="2015936"/>
           </a:xfrm>
           <a:prstGeom prst="rect">
             <a:avLst/>
@@ -6406,7 +6333,7 @@
                 <a:latin typeface="Segoe UI"/>
               </a:defRPr>
             </a:pPr>
-            <a:endParaRPr/>
+            <a:endParaRPr sz="2400" dirty="0"/>
           </a:p>
           <a:p>
             <a:pPr>
@@ -6416,6 +6343,7 @@
               <a:defRPr sz="1400" b="1"/>
             </a:pPr>
             <a:r>
+              <a:rPr sz="2400" dirty="0"/>
               <a:t>Strategy Description</a:t>
             </a:r>
           </a:p>
@@ -6424,6 +6352,7 @@
               <a:defRPr sz="1100"/>
             </a:pPr>
             <a:r>
+              <a:rPr sz="2400" dirty="0"/>
               <a:t>Long-term Bitcoin ecosystem investment with selective exposure to Bitcoin ETFs and derivatives</a:t>
             </a:r>
           </a:p>
@@ -6464,119 +6393,6 @@
             <p:ph type="title"/>
           </p:nvPr>
         </p:nvSpPr>
-        <p:spPr/>
-        <p:txBody>
-          <a:bodyPr wrap="square" anchor="t"/>
-          <a:lstStyle/>
-          <a:p>
-            <a:pPr>
-              <a:defRPr sz="3200" b="1">
-                <a:solidFill>
-                  <a:srgbClr val="333333"/>
-                </a:solidFill>
-              </a:defRPr>
-            </a:pPr>
-            <a:r>
-              <a:t>Team Analysis</a:t>
-            </a:r>
-          </a:p>
-        </p:txBody>
-      </p:sp>
-      <p:sp>
-        <p:nvSpPr>
-          <p:cNvPr id="3" name="TextBox 2"/>
-          <p:cNvSpPr txBox="1"/>
-          <p:nvPr/>
-        </p:nvSpPr>
-        <p:spPr>
-          <a:xfrm>
-            <a:off x="457200" y="1188720"/>
-            <a:ext cx="3606800" cy="1131570"/>
-          </a:xfrm>
-          <a:prstGeom prst="rect">
-            <a:avLst/>
-          </a:prstGeom>
-          <a:noFill/>
-        </p:spPr>
-        <p:txBody>
-          <a:bodyPr wrap="square" anchor="t">
-            <a:spAutoFit/>
-          </a:bodyPr>
-          <a:lstStyle/>
-          <a:p>
-            <a:pPr>
-              <a:defRPr sz="1100">
-                <a:solidFill>
-                  <a:srgbClr val="333333"/>
-                </a:solidFill>
-                <a:latin typeface="Segoe UI"/>
-              </a:defRPr>
-            </a:pPr>
-            <a:endParaRPr/>
-          </a:p>
-          <a:p>
-            <a:pPr>
-              <a:spcAft>
-                <a:spcPts val="200"/>
-              </a:spcAft>
-              <a:defRPr sz="1400" b="1"/>
-            </a:pPr>
-            <a:r>
-              <a:t>Key Personne</a:t>
-            </a:r>
-          </a:p>
-          <a:p>
-            <a:pPr>
-              <a:spcAft>
-                <a:spcPts val="600"/>
-              </a:spcAft>
-              <a:defRPr sz="1200" i="1">
-                <a:solidFill>
-                  <a:srgbClr val="662D91"/>
-                </a:solidFill>
-              </a:defRPr>
-            </a:pPr>
-            <a:r>
-              <a:t>l</a:t>
-            </a:r>
-          </a:p>
-        </p:txBody>
-      </p:sp>
-    </p:spTree>
-  </p:cSld>
-  <p:clrMapOvr>
-    <a:masterClrMapping/>
-  </p:clrMapOvr>
-</p:sld>
-</file>
-
-<file path=ppt/slides/slide5.xml><?xml version="1.0" encoding="utf-8"?>
-<p:sld xmlns:a="http://schemas.openxmlformats.org/drawingml/2006/main" xmlns:r="http://schemas.openxmlformats.org/officeDocument/2006/relationships" xmlns:p="http://schemas.openxmlformats.org/presentationml/2006/main">
-  <p:cSld>
-    <p:spTree>
-      <p:nvGrpSpPr>
-        <p:cNvPr id="1" name=""/>
-        <p:cNvGrpSpPr/>
-        <p:nvPr/>
-      </p:nvGrpSpPr>
-      <p:grpSpPr>
-        <a:xfrm>
-          <a:off x="0" y="0"/>
-          <a:ext cx="0" cy="0"/>
-          <a:chOff x="0" y="0"/>
-          <a:chExt cx="0" cy="0"/>
-        </a:xfrm>
-      </p:grpSpPr>
-      <p:sp>
-        <p:nvSpPr>
-          <p:cNvPr id="2" name="Title 1"/>
-          <p:cNvSpPr>
-            <a:spLocks noGrp="1"/>
-          </p:cNvSpPr>
-          <p:nvPr>
-            <p:ph type="title"/>
-          </p:nvPr>
-        </p:nvSpPr>
         <p:spPr>
           <a:xfrm>
             <a:off x="623582" y="239291"/>
@@ -6633,14 +6449,14 @@
           <p:nvPr>
             <p:extLst>
               <p:ext uri="{D42A27DB-BD31-4B8C-83A1-F6EECF244321}">
-                <p14:modId xmlns:p14="http://schemas.microsoft.com/office/powerpoint/2010/main" val="1358153805"/>
+                <p14:modId xmlns:p14="http://schemas.microsoft.com/office/powerpoint/2010/main" val="3275065824"/>
               </p:ext>
             </p:extLst>
           </p:nvPr>
         </p:nvGraphicFramePr>
         <p:xfrm>
-          <a:off x="7449424" y="-1"/>
-          <a:ext cx="4118994" cy="6949440"/>
+          <a:off x="6932645" y="-1"/>
+          <a:ext cx="4635774" cy="6980886"/>
         </p:xfrm>
         <a:graphic>
           <a:graphicData uri="http://schemas.openxmlformats.org/drawingml/2006/table">
@@ -6649,14 +6465,14 @@
                 <a:tableStyleId>{5C22544A-7EE6-4342-B048-85BDC9FD1C3A}</a:tableStyleId>
               </a:tblPr>
               <a:tblGrid>
-                <a:gridCol w="2059497">
+                <a:gridCol w="2317887">
                   <a:extLst>
                     <a:ext uri="{9D8B030D-6E8A-4147-A177-3AD203B41FA5}">
                       <a16:colId xmlns:a16="http://schemas.microsoft.com/office/drawing/2014/main" val="20000"/>
                     </a:ext>
                   </a:extLst>
                 </a:gridCol>
-                <a:gridCol w="2059497">
+                <a:gridCol w="2317887">
                   <a:extLst>
                     <a:ext uri="{9D8B030D-6E8A-4147-A177-3AD203B41FA5}">
                       <a16:colId xmlns:a16="http://schemas.microsoft.com/office/drawing/2014/main" val="20001"/>
@@ -6664,7 +6480,7 @@
                   </a:extLst>
                 </a:gridCol>
               </a:tblGrid>
-              <a:tr h="231029">
+              <a:tr h="237988">
                 <a:tc>
                   <a:txBody>
                     <a:bodyPr/>
@@ -6679,13 +6495,17 @@
                         </a:defRPr>
                       </a:pPr>
                       <a:r>
+                        <a:rPr dirty="0"/>
                         <a:t>Asset</a:t>
                       </a:r>
                     </a:p>
                   </a:txBody>
                   <a:tcPr>
                     <a:solidFill>
-                      <a:srgbClr val="E6E6E6"/>
+                      <a:schemeClr val="accent2">
+                        <a:lumMod val="60000"/>
+                        <a:lumOff val="40000"/>
+                      </a:schemeClr>
                     </a:solidFill>
                   </a:tcPr>
                 </a:tc>
@@ -6709,7 +6529,10 @@
                   </a:txBody>
                   <a:tcPr>
                     <a:solidFill>
-                      <a:srgbClr val="E6E6E6"/>
+                      <a:schemeClr val="accent2">
+                        <a:lumMod val="60000"/>
+                        <a:lumOff val="40000"/>
+                      </a:schemeClr>
                     </a:solidFill>
                   </a:tcPr>
                 </a:tc>
@@ -6719,7 +6542,7 @@
                   </a:ext>
                 </a:extLst>
               </a:tr>
-              <a:tr h="231029">
+              <a:tr h="267737">
                 <a:tc>
                   <a:txBody>
                     <a:bodyPr/>
@@ -6741,7 +6564,10 @@
                   </a:txBody>
                   <a:tcPr>
                     <a:solidFill>
-                      <a:srgbClr val="F5F5FA"/>
+                      <a:schemeClr val="accent2">
+                        <a:lumMod val="60000"/>
+                        <a:lumOff val="40000"/>
+                      </a:schemeClr>
                     </a:solidFill>
                   </a:tcPr>
                 </a:tc>
@@ -6759,13 +6585,17 @@
                         </a:defRPr>
                       </a:pPr>
                       <a:r>
+                        <a:rPr sz="1200" dirty="0"/>
                         <a:t>74.5%</a:t>
                       </a:r>
                     </a:p>
                   </a:txBody>
                   <a:tcPr>
                     <a:solidFill>
-                      <a:srgbClr val="F5F5FA"/>
+                      <a:schemeClr val="accent2">
+                        <a:lumMod val="60000"/>
+                        <a:lumOff val="40000"/>
+                      </a:schemeClr>
                     </a:solidFill>
                   </a:tcPr>
                 </a:tc>
@@ -6775,7 +6605,7 @@
                   </a:ext>
                 </a:extLst>
               </a:tr>
-              <a:tr h="231029">
+              <a:tr h="267737">
                 <a:tc>
                   <a:txBody>
                     <a:bodyPr/>
@@ -6795,7 +6625,12 @@
                     </a:p>
                   </a:txBody>
                   <a:tcPr>
-                    <a:noFill/>
+                    <a:solidFill>
+                      <a:schemeClr val="accent2">
+                        <a:lumMod val="60000"/>
+                        <a:lumOff val="40000"/>
+                      </a:schemeClr>
+                    </a:solidFill>
                   </a:tcPr>
                 </a:tc>
                 <a:tc>
@@ -6812,12 +6647,18 @@
                         </a:defRPr>
                       </a:pPr>
                       <a:r>
+                        <a:rPr sz="1200" dirty="0"/>
                         <a:t>14.8%</a:t>
                       </a:r>
                     </a:p>
                   </a:txBody>
                   <a:tcPr>
-                    <a:noFill/>
+                    <a:solidFill>
+                      <a:schemeClr val="accent2">
+                        <a:lumMod val="60000"/>
+                        <a:lumOff val="40000"/>
+                      </a:schemeClr>
+                    </a:solidFill>
                   </a:tcPr>
                 </a:tc>
                 <a:extLst>
@@ -6826,7 +6667,7 @@
                   </a:ext>
                 </a:extLst>
               </a:tr>
-              <a:tr h="231029">
+              <a:tr h="267737">
                 <a:tc>
                   <a:txBody>
                     <a:bodyPr/>
@@ -6847,7 +6688,10 @@
                   </a:txBody>
                   <a:tcPr>
                     <a:solidFill>
-                      <a:srgbClr val="F5F5FA"/>
+                      <a:schemeClr val="accent2">
+                        <a:lumMod val="60000"/>
+                        <a:lumOff val="40000"/>
+                      </a:schemeClr>
                     </a:solidFill>
                   </a:tcPr>
                 </a:tc>
@@ -6865,13 +6709,17 @@
                         </a:defRPr>
                       </a:pPr>
                       <a:r>
+                        <a:rPr sz="1200"/>
                         <a:t>8.2%</a:t>
                       </a:r>
                     </a:p>
                   </a:txBody>
                   <a:tcPr>
                     <a:solidFill>
-                      <a:srgbClr val="F5F5FA"/>
+                      <a:schemeClr val="accent2">
+                        <a:lumMod val="60000"/>
+                        <a:lumOff val="40000"/>
+                      </a:schemeClr>
                     </a:solidFill>
                   </a:tcPr>
                 </a:tc>
@@ -6881,7 +6729,7 @@
                   </a:ext>
                 </a:extLst>
               </a:tr>
-              <a:tr h="231029">
+              <a:tr h="267737">
                 <a:tc>
                   <a:txBody>
                     <a:bodyPr/>
@@ -6896,90 +6744,17 @@
                         </a:defRPr>
                       </a:pPr>
                       <a:r>
+                        <a:rPr dirty="0"/>
                         <a:t>Cash/Stablecoin Reserve</a:t>
                       </a:r>
                     </a:p>
                   </a:txBody>
                   <a:tcPr>
-                    <a:noFill/>
-                  </a:tcPr>
-                </a:tc>
-                <a:tc>
-                  <a:txBody>
-                    <a:bodyPr/>
-                    <a:lstStyle/>
-                    <a:p>
-                      <a:pPr algn="l">
-                        <a:defRPr sz="1000" b="0">
-                          <a:solidFill>
-                            <a:srgbClr val="000000"/>
-                          </a:solidFill>
-                          <a:latin typeface="Segoe UI"/>
-                        </a:defRPr>
-                      </a:pPr>
-                      <a:r>
-                        <a:t>2.5%</a:t>
-                      </a:r>
-                    </a:p>
-                  </a:txBody>
-                  <a:tcPr>
-                    <a:noFill/>
-                  </a:tcPr>
-                </a:tc>
-                <a:extLst>
-                  <a:ext uri="{0D108BD9-81ED-4DB2-BD59-A6C34878D82A}">
-                    <a16:rowId xmlns:a16="http://schemas.microsoft.com/office/drawing/2014/main" val="10004"/>
-                  </a:ext>
-                </a:extLst>
-              </a:tr>
-              <a:tr h="519814">
-                <a:tc>
-                  <a:txBody>
-                    <a:bodyPr/>
-                    <a:lstStyle/>
-                    <a:p>
-                      <a:pPr algn="l">
-                        <a:defRPr sz="1000" b="1">
-                          <a:solidFill>
-                            <a:srgbClr val="000000"/>
-                          </a:solidFill>
-                          <a:latin typeface="Segoe UI"/>
-                        </a:defRPr>
-                      </a:pPr>
-                      <a:r>
-                        <a:t>$5.2M</a:t>
-                      </a:r>
-                    </a:p>
-                    <a:p>
-                      <a:pPr algn="l">
-                        <a:defRPr sz="1000" b="1">
-                          <a:solidFill>
-                            <a:srgbClr val="000000"/>
-                          </a:solidFill>
-                          <a:latin typeface="Segoe UI"/>
-                        </a:defRPr>
-                      </a:pPr>
-                      <a:r>
-                        <a:t>Bitcoin Strategy</a:t>
-                      </a:r>
-                    </a:p>
-                    <a:p>
-                      <a:pPr algn="l">
-                        <a:defRPr sz="1000" b="1">
-                          <a:solidFill>
-                            <a:srgbClr val="000000"/>
-                          </a:solidFill>
-                          <a:latin typeface="Segoe UI"/>
-                        </a:defRPr>
-                      </a:pPr>
-                      <a:r>
-                        <a:t>HODL strategy</a:t>
-                      </a:r>
-                    </a:p>
-                  </a:txBody>
-                  <a:tcPr>
                     <a:solidFill>
-                      <a:srgbClr val="F5F5FA"/>
+                      <a:schemeClr val="accent2">
+                        <a:lumMod val="60000"/>
+                        <a:lumOff val="40000"/>
+                      </a:schemeClr>
                     </a:solidFill>
                   </a:tcPr>
                 </a:tc>
@@ -6997,13 +6772,108 @@
                         </a:defRPr>
                       </a:pPr>
                       <a:r>
+                        <a:rPr sz="1200" dirty="0"/>
+                        <a:t>2.5%</a:t>
+                      </a:r>
+                    </a:p>
+                  </a:txBody>
+                  <a:tcPr>
+                    <a:solidFill>
+                      <a:schemeClr val="accent2">
+                        <a:lumMod val="60000"/>
+                        <a:lumOff val="40000"/>
+                      </a:schemeClr>
+                    </a:solidFill>
+                  </a:tcPr>
+                </a:tc>
+                <a:extLst>
+                  <a:ext uri="{0D108BD9-81ED-4DB2-BD59-A6C34878D82A}">
+                    <a16:rowId xmlns:a16="http://schemas.microsoft.com/office/drawing/2014/main" val="10004"/>
+                  </a:ext>
+                </a:extLst>
+              </a:tr>
+              <a:tr h="535474">
+                <a:tc>
+                  <a:txBody>
+                    <a:bodyPr/>
+                    <a:lstStyle/>
+                    <a:p>
+                      <a:pPr algn="l">
+                        <a:defRPr sz="1000" b="1">
+                          <a:solidFill>
+                            <a:srgbClr val="000000"/>
+                          </a:solidFill>
+                          <a:latin typeface="Segoe UI"/>
+                        </a:defRPr>
+                      </a:pPr>
+                      <a:r>
+                        <a:rPr dirty="0"/>
+                        <a:t>$5.2M</a:t>
+                      </a:r>
+                    </a:p>
+                    <a:p>
+                      <a:pPr algn="l">
+                        <a:defRPr sz="1000" b="1">
+                          <a:solidFill>
+                            <a:srgbClr val="000000"/>
+                          </a:solidFill>
+                          <a:latin typeface="Segoe UI"/>
+                        </a:defRPr>
+                      </a:pPr>
+                      <a:r>
+                        <a:rPr dirty="0"/>
+                        <a:t>Bitcoin Strategy</a:t>
+                      </a:r>
+                    </a:p>
+                    <a:p>
+                      <a:pPr algn="l">
+                        <a:defRPr sz="1000" b="1">
+                          <a:solidFill>
+                            <a:srgbClr val="000000"/>
+                          </a:solidFill>
+                          <a:latin typeface="Segoe UI"/>
+                        </a:defRPr>
+                      </a:pPr>
+                      <a:r>
+                        <a:rPr dirty="0"/>
+                        <a:t>HODL strategy</a:t>
+                      </a:r>
+                    </a:p>
+                  </a:txBody>
+                  <a:tcPr>
+                    <a:solidFill>
+                      <a:schemeClr val="accent2">
+                        <a:lumMod val="60000"/>
+                        <a:lumOff val="40000"/>
+                      </a:schemeClr>
+                    </a:solidFill>
+                  </a:tcPr>
+                </a:tc>
+                <a:tc>
+                  <a:txBody>
+                    <a:bodyPr/>
+                    <a:lstStyle/>
+                    <a:p>
+                      <a:pPr algn="l">
+                        <a:defRPr sz="1000" b="0">
+                          <a:solidFill>
+                            <a:srgbClr val="000000"/>
+                          </a:solidFill>
+                          <a:latin typeface="Segoe UI"/>
+                        </a:defRPr>
+                      </a:pPr>
+                      <a:r>
+                        <a:rPr sz="1200" dirty="0"/>
                         <a:t>80.0%</a:t>
                       </a:r>
                     </a:p>
                   </a:txBody>
                   <a:tcPr>
                     <a:solidFill>
-                      <a:srgbClr val="F5F5FA"/>
+                      <a:schemeClr val="accent2">
+                        <a:lumMod val="60000"/>
+                        <a:lumOff val="40000"/>
+                      </a:schemeClr>
                     </a:solidFill>
                   </a:tcPr>
                 </a:tc>
@@ -7013,7 +6883,7 @@
                   </a:ext>
                 </a:extLst>
               </a:tr>
-              <a:tr h="519814">
+              <a:tr h="507340">
                 <a:tc>
                   <a:txBody>
                     <a:bodyPr/>
@@ -7046,7 +6916,12 @@
                     </a:p>
                   </a:txBody>
                   <a:tcPr>
-                    <a:noFill/>
+                    <a:solidFill>
+                      <a:schemeClr val="accent2">
+                        <a:lumMod val="60000"/>
+                        <a:lumOff val="40000"/>
+                      </a:schemeClr>
+                    </a:solidFill>
                   </a:tcPr>
                 </a:tc>
                 <a:tc>
@@ -7063,12 +6938,18 @@
                         </a:defRPr>
                       </a:pPr>
                       <a:r>
+                        <a:rPr sz="1200" dirty="0"/>
                         <a:t>15.0%</a:t>
                       </a:r>
                     </a:p>
                   </a:txBody>
                   <a:tcPr>
-                    <a:noFill/>
+                    <a:solidFill>
+                      <a:schemeClr val="accent2">
+                        <a:lumMod val="60000"/>
+                        <a:lumOff val="40000"/>
+                      </a:schemeClr>
+                    </a:solidFill>
                   </a:tcPr>
                 </a:tc>
                 <a:extLst>
@@ -7077,7 +6958,7 @@
                   </a:ext>
                 </a:extLst>
               </a:tr>
-              <a:tr h="519814">
+              <a:tr h="535474">
                 <a:tc>
                   <a:txBody>
                     <a:bodyPr/>
@@ -7111,7 +6992,10 @@
                   </a:txBody>
                   <a:tcPr>
                     <a:solidFill>
-                      <a:srgbClr val="F5F5FA"/>
+                      <a:schemeClr val="accent2">
+                        <a:lumMod val="60000"/>
+                        <a:lumOff val="40000"/>
+                      </a:schemeClr>
                     </a:solidFill>
                   </a:tcPr>
                 </a:tc>
@@ -7129,13 +7013,17 @@
                         </a:defRPr>
                       </a:pPr>
                       <a:r>
+                        <a:rPr sz="1200" dirty="0"/>
                         <a:t>5.0%</a:t>
                       </a:r>
                     </a:p>
                   </a:txBody>
                   <a:tcPr>
                     <a:solidFill>
-                      <a:srgbClr val="F5F5FA"/>
+                      <a:schemeClr val="accent2">
+                        <a:lumMod val="60000"/>
+                        <a:lumOff val="40000"/>
+                      </a:schemeClr>
                     </a:solidFill>
                   </a:tcPr>
                 </a:tc>
@@ -7145,7 +7033,7 @@
                   </a:ext>
                 </a:extLst>
               </a:tr>
-              <a:tr h="375421">
+              <a:tr h="386731">
                 <a:tc>
                   <a:txBody>
                     <a:bodyPr/>
@@ -7160,6 +7048,7 @@
                         </a:defRPr>
                       </a:pPr>
                       <a:r>
+                        <a:rPr dirty="0"/>
                         <a:t>+21%)</a:t>
                       </a:r>
                     </a:p>
@@ -7173,12 +7062,18 @@
                         </a:defRPr>
                       </a:pPr>
                       <a:r>
+                        <a:rPr dirty="0"/>
                         <a:t>Sharpe Ratio</a:t>
                       </a:r>
                     </a:p>
                   </a:txBody>
                   <a:tcPr>
-                    <a:noFill/>
+                    <a:solidFill>
+                      <a:schemeClr val="accent2">
+                        <a:lumMod val="60000"/>
+                        <a:lumOff val="40000"/>
+                      </a:schemeClr>
+                    </a:solidFill>
                   </a:tcPr>
                 </a:tc>
                 <a:tc>
@@ -7195,12 +7090,18 @@
                         </a:defRPr>
                       </a:pPr>
                       <a:r>
+                        <a:rPr sz="1200" dirty="0"/>
                         <a:t>1.7%</a:t>
                       </a:r>
                     </a:p>
                   </a:txBody>
                   <a:tcPr>
-                    <a:noFill/>
+                    <a:solidFill>
+                      <a:schemeClr val="accent2">
+                        <a:lumMod val="60000"/>
+                        <a:lumOff val="40000"/>
+                      </a:schemeClr>
+                    </a:solidFill>
                   </a:tcPr>
                 </a:tc>
                 <a:extLst>
@@ -7209,7 +7110,7 @@
                   </a:ext>
                 </a:extLst>
               </a:tr>
-              <a:tr h="231029">
+              <a:tr h="267737">
                 <a:tc>
                   <a:txBody>
                     <a:bodyPr/>
@@ -7230,7 +7131,10 @@
                   </a:txBody>
                   <a:tcPr>
                     <a:solidFill>
-                      <a:srgbClr val="F5F5FA"/>
+                      <a:schemeClr val="accent2">
+                        <a:lumMod val="60000"/>
+                        <a:lumOff val="40000"/>
+                      </a:schemeClr>
                     </a:solidFill>
                   </a:tcPr>
                 </a:tc>
@@ -7248,13 +7152,17 @@
                         </a:defRPr>
                       </a:pPr>
                       <a:r>
+                        <a:rPr sz="1200"/>
                         <a:t>38.0%</a:t>
                       </a:r>
                     </a:p>
                   </a:txBody>
                   <a:tcPr>
                     <a:solidFill>
-                      <a:srgbClr val="F5F5FA"/>
+                      <a:schemeClr val="accent2">
+                        <a:lumMod val="60000"/>
+                        <a:lumOff val="40000"/>
+                      </a:schemeClr>
                     </a:solidFill>
                   </a:tcPr>
                 </a:tc>
@@ -7264,7 +7172,7 @@
                   </a:ext>
                 </a:extLst>
               </a:tr>
-              <a:tr h="231029">
+              <a:tr h="267737">
                 <a:tc>
                   <a:txBody>
                     <a:bodyPr/>
@@ -7279,12 +7187,18 @@
                         </a:defRPr>
                       </a:pPr>
                       <a:r>
+                        <a:rPr dirty="0"/>
                         <a:t>Average Transaction Size</a:t>
                       </a:r>
                     </a:p>
                   </a:txBody>
                   <a:tcPr>
-                    <a:noFill/>
+                    <a:solidFill>
+                      <a:schemeClr val="accent2">
+                        <a:lumMod val="60000"/>
+                        <a:lumOff val="40000"/>
+                      </a:schemeClr>
+                    </a:solidFill>
                   </a:tcPr>
                 </a:tc>
                 <a:tc>
@@ -7301,12 +7215,18 @@
                         </a:defRPr>
                       </a:pPr>
                       <a:r>
+                        <a:rPr sz="1200"/>
                         <a:t>50.0%</a:t>
                       </a:r>
                     </a:p>
                   </a:txBody>
                   <a:tcPr>
-                    <a:noFill/>
+                    <a:solidFill>
+                      <a:schemeClr val="accent2">
+                        <a:lumMod val="60000"/>
+                        <a:lumOff val="40000"/>
+                      </a:schemeClr>
+                    </a:solidFill>
                   </a:tcPr>
                 </a:tc>
                 <a:extLst>
@@ -7315,7 +7235,7 @@
                   </a:ext>
                 </a:extLst>
               </a:tr>
-              <a:tr h="375421">
+              <a:tr h="386731">
                 <a:tc>
                   <a:txBody>
                     <a:bodyPr/>
@@ -7349,7 +7269,10 @@
                   </a:txBody>
                   <a:tcPr>
                     <a:solidFill>
-                      <a:srgbClr val="F5F5FA"/>
+                      <a:schemeClr val="accent2">
+                        <a:lumMod val="60000"/>
+                        <a:lumOff val="40000"/>
+                      </a:schemeClr>
                     </a:solidFill>
                   </a:tcPr>
                 </a:tc>
@@ -7367,13 +7290,17 @@
                         </a:defRPr>
                       </a:pPr>
                       <a:r>
+                        <a:rPr sz="1200" dirty="0"/>
                         <a:t>10.0%</a:t>
                       </a:r>
                     </a:p>
                   </a:txBody>
                   <a:tcPr>
                     <a:solidFill>
-                      <a:srgbClr val="F5F5FA"/>
+                      <a:schemeClr val="accent2">
+                        <a:lumMod val="60000"/>
+                        <a:lumOff val="40000"/>
+                      </a:schemeClr>
                     </a:solidFill>
                   </a:tcPr>
                 </a:tc>
@@ -7383,7 +7310,7 @@
                   </a:ext>
                 </a:extLst>
               </a:tr>
-              <a:tr h="375421">
+              <a:tr h="386731">
                 <a:tc>
                   <a:txBody>
                     <a:bodyPr/>
@@ -7416,7 +7343,12 @@
                     </a:p>
                   </a:txBody>
                   <a:tcPr>
-                    <a:noFill/>
+                    <a:solidFill>
+                      <a:schemeClr val="accent2">
+                        <a:lumMod val="60000"/>
+                        <a:lumOff val="40000"/>
+                      </a:schemeClr>
+                    </a:solidFill>
                   </a:tcPr>
                 </a:tc>
                 <a:tc>
@@ -7433,13 +7365,18 @@
                         </a:defRPr>
                       </a:pPr>
                       <a:r>
-                        <a:rPr dirty="0"/>
+                        <a:rPr sz="1200" dirty="0"/>
                         <a:t>60.0%</a:t>
                       </a:r>
                     </a:p>
                   </a:txBody>
                   <a:tcPr>
-                    <a:noFill/>
+                    <a:solidFill>
+                      <a:schemeClr val="accent2">
+                        <a:lumMod val="60000"/>
+                        <a:lumOff val="40000"/>
+                      </a:schemeClr>
+                    </a:solidFill>
                   </a:tcPr>
                 </a:tc>
                 <a:extLst>
@@ -7448,7 +7385,7 @@
                   </a:ext>
                 </a:extLst>
               </a:tr>
-              <a:tr h="519814">
+              <a:tr h="535474">
                 <a:tc>
                   <a:txBody>
                     <a:bodyPr/>
@@ -7495,7 +7432,10 @@
                   </a:txBody>
                   <a:tcPr>
                     <a:solidFill>
-                      <a:srgbClr val="F5F5FA"/>
+                      <a:schemeClr val="accent2">
+                        <a:lumMod val="60000"/>
+                        <a:lumOff val="40000"/>
+                      </a:schemeClr>
                     </a:solidFill>
                   </a:tcPr>
                 </a:tc>
@@ -7513,13 +7453,17 @@
                         </a:defRPr>
                       </a:pPr>
                       <a:r>
+                        <a:rPr sz="1200" dirty="0"/>
                         <a:t>14.0%</a:t>
                       </a:r>
                     </a:p>
                   </a:txBody>
                   <a:tcPr>
                     <a:solidFill>
-                      <a:srgbClr val="F5F5FA"/>
+                      <a:schemeClr val="accent2">
+                        <a:lumMod val="60000"/>
+                        <a:lumOff val="40000"/>
+                      </a:schemeClr>
                     </a:solidFill>
                   </a:tcPr>
                 </a:tc>
@@ -7529,7 +7473,7 @@
                   </a:ext>
                 </a:extLst>
               </a:tr>
-              <a:tr h="375421">
+              <a:tr h="386731">
                 <a:tc>
                   <a:txBody>
                     <a:bodyPr/>
@@ -7562,7 +7506,12 @@
                     </a:p>
                   </a:txBody>
                   <a:tcPr>
-                    <a:noFill/>
+                    <a:solidFill>
+                      <a:schemeClr val="accent2">
+                        <a:lumMod val="60000"/>
+                        <a:lumOff val="40000"/>
+                      </a:schemeClr>
+                    </a:solidFill>
                   </a:tcPr>
                 </a:tc>
                 <a:tc>
@@ -7579,12 +7528,18 @@
                         </a:defRPr>
                       </a:pPr>
                       <a:r>
+                        <a:rPr sz="1200" dirty="0"/>
                         <a:t>100.0%</a:t>
                       </a:r>
                     </a:p>
                   </a:txBody>
                   <a:tcPr>
-                    <a:noFill/>
+                    <a:solidFill>
+                      <a:schemeClr val="accent2">
+                        <a:lumMod val="60000"/>
+                        <a:lumOff val="40000"/>
+                      </a:schemeClr>
+                    </a:solidFill>
                   </a:tcPr>
                 </a:tc>
                 <a:extLst>
@@ -7593,7 +7548,7 @@
                   </a:ext>
                 </a:extLst>
               </a:tr>
-              <a:tr h="1386171">
+              <a:tr h="1352906">
                 <a:tc>
                   <a:txBody>
                     <a:bodyPr/>
@@ -7671,7 +7626,10 @@
                   </a:txBody>
                   <a:tcPr>
                     <a:solidFill>
-                      <a:srgbClr val="F5F5FA"/>
+                      <a:schemeClr val="accent2">
+                        <a:lumMod val="60000"/>
+                        <a:lumOff val="40000"/>
+                      </a:schemeClr>
                     </a:solidFill>
                   </a:tcPr>
                 </a:tc>
@@ -7689,14 +7647,17 @@
                         </a:defRPr>
                       </a:pPr>
                       <a:r>
-                        <a:rPr dirty="0"/>
+                        <a:rPr sz="1200" dirty="0"/>
                         <a:t>5.0%</a:t>
                       </a:r>
                     </a:p>
                   </a:txBody>
                   <a:tcPr>
                     <a:solidFill>
-                      <a:srgbClr val="F5F5FA"/>
+                      <a:schemeClr val="accent2">
+                        <a:lumMod val="60000"/>
+                        <a:lumOff val="40000"/>
+                      </a:schemeClr>
                     </a:solidFill>
                   </a:tcPr>
                 </a:tc>
@@ -7718,7 +7679,7 @@
 </p:sld>
 </file>
 
-<file path=ppt/slides/slide6.xml><?xml version="1.0" encoding="utf-8"?>
+<file path=ppt/slides/slide5.xml><?xml version="1.0" encoding="utf-8"?>
 <p:sld xmlns:a="http://schemas.openxmlformats.org/drawingml/2006/main" xmlns:r="http://schemas.openxmlformats.org/officeDocument/2006/relationships" xmlns:p="http://schemas.openxmlformats.org/presentationml/2006/main">
   <p:cSld>
     <p:spTree>
@@ -8254,7 +8215,7 @@
                 <a:latin typeface="Segoe UI"/>
               </a:defRPr>
             </a:pPr>
-            <a:endParaRPr/>
+            <a:endParaRPr dirty="0"/>
           </a:p>
           <a:p>
             <a:pPr>
@@ -8264,6 +8225,7 @@
               <a:defRPr sz="1600" b="1"/>
             </a:pPr>
             <a:r>
+              <a:rPr dirty="0"/>
               <a:t>Risk Assessment</a:t>
             </a:r>
           </a:p>
@@ -8272,7 +8234,268 @@
               <a:defRPr sz="1100"/>
             </a:pPr>
             <a:r>
+              <a:rPr dirty="0"/>
               <a:t>The crypto fund has a medium overall risk level. The primary risk exposures are Operational Risk, Concentration Risk, and Regulatory Risk, with scores of 8.5, 10, and 7.0, respectively. These risks are significant due to factors such as the lack of a clear technical lead, limited multi-sig usage, and high portfolio asset concentration. The fund's high concentration in a few assets and limited liquid reserves also contribute to these risks, highlighting the potential for significant losses if these factors are not addressed.</a:t>
+            </a:r>
+          </a:p>
+        </p:txBody>
+      </p:sp>
+    </p:spTree>
+  </p:cSld>
+  <p:clrMapOvr>
+    <a:masterClrMapping/>
+  </p:clrMapOvr>
+</p:sld>
+</file>
+
+<file path=ppt/slides/slide6.xml><?xml version="1.0" encoding="utf-8"?>
+<p:sld xmlns:a="http://schemas.openxmlformats.org/drawingml/2006/main" xmlns:r="http://schemas.openxmlformats.org/officeDocument/2006/relationships" xmlns:p="http://schemas.openxmlformats.org/presentationml/2006/main">
+  <p:cSld>
+    <p:spTree>
+      <p:nvGrpSpPr>
+        <p:cNvPr id="1" name=""/>
+        <p:cNvGrpSpPr/>
+        <p:nvPr/>
+      </p:nvGrpSpPr>
+      <p:grpSpPr>
+        <a:xfrm>
+          <a:off x="0" y="0"/>
+          <a:ext cx="0" cy="0"/>
+          <a:chOff x="0" y="0"/>
+          <a:chExt cx="0" cy="0"/>
+        </a:xfrm>
+      </p:grpSpPr>
+      <p:sp>
+        <p:nvSpPr>
+          <p:cNvPr id="2" name="Title 1"/>
+          <p:cNvSpPr>
+            <a:spLocks noGrp="1"/>
+          </p:cNvSpPr>
+          <p:nvPr>
+            <p:ph type="title"/>
+          </p:nvPr>
+        </p:nvSpPr>
+        <p:spPr/>
+        <p:txBody>
+          <a:bodyPr wrap="square" anchor="t"/>
+          <a:lstStyle/>
+          <a:p>
+            <a:pPr>
+              <a:defRPr sz="3200" b="1">
+                <a:solidFill>
+                  <a:srgbClr val="333333"/>
+                </a:solidFill>
+              </a:defRPr>
+            </a:pPr>
+            <a:r>
+              <a:t>Compliance Overview</a:t>
+            </a:r>
+          </a:p>
+        </p:txBody>
+      </p:sp>
+      <p:sp>
+        <p:nvSpPr>
+          <p:cNvPr id="3" name="TextBox 2"/>
+          <p:cNvSpPr txBox="1"/>
+          <p:nvPr/>
+        </p:nvSpPr>
+        <p:spPr>
+          <a:xfrm>
+            <a:off x="457200" y="1188720"/>
+            <a:ext cx="5029200" cy="1371600"/>
+          </a:xfrm>
+          <a:prstGeom prst="rect">
+            <a:avLst/>
+          </a:prstGeom>
+          <a:noFill/>
+        </p:spPr>
+        <p:txBody>
+          <a:bodyPr wrap="square" anchor="ctr">
+            <a:spAutoFit/>
+          </a:bodyPr>
+          <a:lstStyle/>
+          <a:p>
+            <a:pPr>
+              <a:defRPr sz="1400">
+                <a:solidFill>
+                  <a:srgbClr val="333333"/>
+                </a:solidFill>
+                <a:latin typeface="Segoe UI"/>
+              </a:defRPr>
+            </a:pPr>
+            <a:endParaRPr/>
+          </a:p>
+          <a:p>
+            <a:pPr algn="ctr">
+              <a:defRPr sz="1600" b="1"/>
+            </a:pPr>
+            <a:r>
+              <a:t>Overall Compliance</a:t>
+            </a:r>
+          </a:p>
+          <a:p>
+            <a:pPr algn="ctr">
+              <a:defRPr sz="2800" b="1">
+                <a:solidFill>
+                  <a:srgbClr val="FF9933"/>
+                </a:solidFill>
+              </a:defRPr>
+            </a:pPr>
+            <a:r>
+              <a:t>Partial (44.8/100)</a:t>
+            </a:r>
+          </a:p>
+        </p:txBody>
+      </p:sp>
+      <p:sp>
+        <p:nvSpPr>
+          <p:cNvPr id="4" name="TextBox 3"/>
+          <p:cNvSpPr txBox="1"/>
+          <p:nvPr/>
+        </p:nvSpPr>
+        <p:spPr>
+          <a:xfrm>
+            <a:off x="457200" y="2834640"/>
+            <a:ext cx="5029200" cy="1828800"/>
+          </a:xfrm>
+          <a:prstGeom prst="rect">
+            <a:avLst/>
+          </a:prstGeom>
+          <a:noFill/>
+        </p:spPr>
+        <p:txBody>
+          <a:bodyPr wrap="square" anchor="t">
+            <a:spAutoFit/>
+          </a:bodyPr>
+          <a:lstStyle/>
+          <a:p>
+            <a:pPr>
+              <a:defRPr sz="1200">
+                <a:solidFill>
+                  <a:srgbClr val="333333"/>
+                </a:solidFill>
+                <a:latin typeface="Segoe UI"/>
+              </a:defRPr>
+            </a:pPr>
+            <a:endParaRPr dirty="0"/>
+          </a:p>
+          <a:p>
+            <a:pPr>
+              <a:spcAft>
+                <a:spcPts val="600"/>
+              </a:spcAft>
+              <a:defRPr sz="1400" b="1"/>
+            </a:pPr>
+            <a:r>
+              <a:rPr dirty="0"/>
+              <a:t>Compliance Overview</a:t>
+            </a:r>
+          </a:p>
+          <a:p>
+            <a:pPr>
+              <a:spcAft>
+                <a:spcPts val="200"/>
+              </a:spcAft>
+              <a:defRPr sz="1200" b="1"/>
+            </a:pPr>
+            <a:r>
+              <a:rPr dirty="0"/>
+              <a:t>Relevant Jurisdictions:</a:t>
+            </a:r>
+          </a:p>
+          <a:p>
+            <a:pPr>
+              <a:spcAft>
+                <a:spcPts val="600"/>
+              </a:spcAft>
+              <a:defRPr sz="1100"/>
+            </a:pPr>
+            <a:r>
+              <a:rPr dirty="0"/>
+              <a:t>Singapore, US, EU</a:t>
+            </a:r>
+          </a:p>
+          <a:p>
+            <a:pPr>
+              <a:spcAft>
+                <a:spcPts val="200"/>
+              </a:spcAft>
+              <a:defRPr sz="1200" b="1"/>
+            </a:pPr>
+            <a:r>
+              <a:rPr dirty="0"/>
+              <a:t>KYC/AML Coverage:</a:t>
+            </a:r>
+          </a:p>
+          <a:p>
+            <a:pPr>
+              <a:spcAft>
+                <a:spcPts val="200"/>
+              </a:spcAft>
+              <a:defRPr sz="1100" b="1">
+                <a:solidFill>
+                  <a:srgbClr val="FF3300"/>
+                </a:solidFill>
+              </a:defRPr>
+            </a:pPr>
+            <a:r>
+              <a:rPr dirty="0"/>
+              <a:t>32.8% Coverage</a:t>
+            </a:r>
+          </a:p>
+        </p:txBody>
+      </p:sp>
+      <p:sp>
+        <p:nvSpPr>
+          <p:cNvPr id="5" name="TextBox 4"/>
+          <p:cNvSpPr txBox="1"/>
+          <p:nvPr/>
+        </p:nvSpPr>
+        <p:spPr>
+          <a:xfrm>
+            <a:off x="5943600" y="1188720"/>
+            <a:ext cx="5791200" cy="3123932"/>
+          </a:xfrm>
+          <a:prstGeom prst="rect">
+            <a:avLst/>
+          </a:prstGeom>
+          <a:noFill/>
+        </p:spPr>
+        <p:txBody>
+          <a:bodyPr wrap="square" anchor="t">
+            <a:spAutoFit/>
+          </a:bodyPr>
+          <a:lstStyle/>
+          <a:p>
+            <a:pPr>
+              <a:defRPr sz="1200">
+                <a:solidFill>
+                  <a:srgbClr val="333333"/>
+                </a:solidFill>
+                <a:latin typeface="Segoe UI"/>
+              </a:defRPr>
+            </a:pPr>
+            <a:endParaRPr sz="1600" dirty="0"/>
+          </a:p>
+          <a:p>
+            <a:pPr>
+              <a:spcAft>
+                <a:spcPts val="600"/>
+              </a:spcAft>
+              <a:defRPr sz="1600" b="1"/>
+            </a:pPr>
+            <a:r>
+              <a:rPr sz="1600" dirty="0"/>
+              <a:t>Compliance Assessment</a:t>
+            </a:r>
+          </a:p>
+          <a:p>
+            <a:pPr>
+              <a:defRPr sz="1100"/>
+            </a:pPr>
+            <a:r>
+              <a:rPr sz="1600" dirty="0"/>
+              <a:t>The crypto fund has a partial compliance level with an overall score of 44.83. Its KYC/AML framework has a coverage score of 32.78, indicating some gaps in procedures, particularly in Singapore and the US. The fund has registrations mentioned in Singapore, the US, and EU, but these are not confirmed. Significant compliance gaps include incomplete regulatory registrations in these jurisdictions and missing KYC/AML procedures. Notably, the fund lacks comprehensive KYC/AML procedures compliant with local requirements in Singapore and the US, such as risk-based approaches and customer identification measures.</a:t>
             </a:r>
           </a:p>
         </p:txBody>
@@ -8325,211 +8548,41 @@
               </a:defRPr>
             </a:pPr>
             <a:r>
-              <a:t>Compliance Overview</a:t>
+              <a:t>Regulatory Status by Jurisdiction</a:t>
             </a:r>
           </a:p>
         </p:txBody>
       </p:sp>
-      <p:sp>
-        <p:nvSpPr>
-          <p:cNvPr id="3" name="TextBox 2"/>
-          <p:cNvSpPr txBox="1"/>
+      <p:pic>
+        <p:nvPicPr>
+          <p:cNvPr id="10" name="Picture 9">
+            <a:extLst>
+              <a:ext uri="{FF2B5EF4-FFF2-40B4-BE49-F238E27FC236}">
+                <a16:creationId xmlns:a16="http://schemas.microsoft.com/office/drawing/2014/main" id="{B975513B-A8C8-1DF1-FA54-0E72AB20D4B2}"/>
+              </a:ext>
+            </a:extLst>
+          </p:cNvPr>
+          <p:cNvPicPr>
+            <a:picLocks noChangeAspect="1"/>
+          </p:cNvPicPr>
           <p:nvPr/>
-        </p:nvSpPr>
+        </p:nvPicPr>
+        <p:blipFill>
+          <a:blip r:embed="rId2"/>
+          <a:stretch>
+            <a:fillRect/>
+          </a:stretch>
+        </p:blipFill>
         <p:spPr>
           <a:xfrm>
-            <a:off x="457200" y="1188720"/>
-            <a:ext cx="5029200" cy="1371600"/>
+            <a:off x="1475209" y="1403285"/>
+            <a:ext cx="8439150" cy="4667250"/>
           </a:xfrm>
           <a:prstGeom prst="rect">
             <a:avLst/>
           </a:prstGeom>
-          <a:noFill/>
         </p:spPr>
-        <p:txBody>
-          <a:bodyPr wrap="square" anchor="ctr">
-            <a:spAutoFit/>
-          </a:bodyPr>
-          <a:lstStyle/>
-          <a:p>
-            <a:pPr>
-              <a:defRPr sz="1400">
-                <a:solidFill>
-                  <a:srgbClr val="333333"/>
-                </a:solidFill>
-                <a:latin typeface="Segoe UI"/>
-              </a:defRPr>
-            </a:pPr>
-            <a:endParaRPr/>
-          </a:p>
-          <a:p>
-            <a:pPr algn="ctr">
-              <a:defRPr sz="1600" b="1"/>
-            </a:pPr>
-            <a:r>
-              <a:t>Overall Compliance</a:t>
-            </a:r>
-          </a:p>
-          <a:p>
-            <a:pPr algn="ctr">
-              <a:defRPr sz="2800" b="1">
-                <a:solidFill>
-                  <a:srgbClr val="FF9933"/>
-                </a:solidFill>
-              </a:defRPr>
-            </a:pPr>
-            <a:r>
-              <a:t>Partial (44.8/100)</a:t>
-            </a:r>
-          </a:p>
-        </p:txBody>
-      </p:sp>
-      <p:sp>
-        <p:nvSpPr>
-          <p:cNvPr id="4" name="TextBox 3"/>
-          <p:cNvSpPr txBox="1"/>
-          <p:nvPr/>
-        </p:nvSpPr>
-        <p:spPr>
-          <a:xfrm>
-            <a:off x="457200" y="2834640"/>
-            <a:ext cx="5029200" cy="1828800"/>
-          </a:xfrm>
-          <a:prstGeom prst="rect">
-            <a:avLst/>
-          </a:prstGeom>
-          <a:noFill/>
-        </p:spPr>
-        <p:txBody>
-          <a:bodyPr wrap="square" anchor="t">
-            <a:spAutoFit/>
-          </a:bodyPr>
-          <a:lstStyle/>
-          <a:p>
-            <a:pPr>
-              <a:defRPr sz="1200">
-                <a:solidFill>
-                  <a:srgbClr val="333333"/>
-                </a:solidFill>
-                <a:latin typeface="Segoe UI"/>
-              </a:defRPr>
-            </a:pPr>
-            <a:endParaRPr/>
-          </a:p>
-          <a:p>
-            <a:pPr>
-              <a:spcAft>
-                <a:spcPts val="600"/>
-              </a:spcAft>
-              <a:defRPr sz="1400" b="1"/>
-            </a:pPr>
-            <a:r>
-              <a:t>Compliance Overview</a:t>
-            </a:r>
-          </a:p>
-          <a:p>
-            <a:pPr>
-              <a:spcAft>
-                <a:spcPts val="200"/>
-              </a:spcAft>
-              <a:defRPr sz="1200" b="1"/>
-            </a:pPr>
-            <a:r>
-              <a:t>Relevant Jurisdictions:</a:t>
-            </a:r>
-          </a:p>
-          <a:p>
-            <a:pPr>
-              <a:spcAft>
-                <a:spcPts val="600"/>
-              </a:spcAft>
-              <a:defRPr sz="1100"/>
-            </a:pPr>
-            <a:r>
-              <a:t>Singapore, US, EU</a:t>
-            </a:r>
-          </a:p>
-          <a:p>
-            <a:pPr>
-              <a:spcAft>
-                <a:spcPts val="200"/>
-              </a:spcAft>
-              <a:defRPr sz="1200" b="1"/>
-            </a:pPr>
-            <a:r>
-              <a:t>KYC/AML Coverage:</a:t>
-            </a:r>
-          </a:p>
-          <a:p>
-            <a:pPr>
-              <a:spcAft>
-                <a:spcPts val="200"/>
-              </a:spcAft>
-              <a:defRPr sz="1100" b="1">
-                <a:solidFill>
-                  <a:srgbClr val="FF3300"/>
-                </a:solidFill>
-              </a:defRPr>
-            </a:pPr>
-            <a:r>
-              <a:t>32.8% Coverage</a:t>
-            </a:r>
-          </a:p>
-        </p:txBody>
-      </p:sp>
-      <p:sp>
-        <p:nvSpPr>
-          <p:cNvPr id="5" name="TextBox 4"/>
-          <p:cNvSpPr txBox="1"/>
-          <p:nvPr/>
-        </p:nvSpPr>
-        <p:spPr>
-          <a:xfrm>
-            <a:off x="5943600" y="1188720"/>
-            <a:ext cx="5791200" cy="5212080"/>
-          </a:xfrm>
-          <a:prstGeom prst="rect">
-            <a:avLst/>
-          </a:prstGeom>
-          <a:noFill/>
-        </p:spPr>
-        <p:txBody>
-          <a:bodyPr wrap="square" anchor="t">
-            <a:spAutoFit/>
-          </a:bodyPr>
-          <a:lstStyle/>
-          <a:p>
-            <a:pPr>
-              <a:defRPr sz="1200">
-                <a:solidFill>
-                  <a:srgbClr val="333333"/>
-                </a:solidFill>
-                <a:latin typeface="Segoe UI"/>
-              </a:defRPr>
-            </a:pPr>
-            <a:endParaRPr/>
-          </a:p>
-          <a:p>
-            <a:pPr>
-              <a:spcAft>
-                <a:spcPts val="600"/>
-              </a:spcAft>
-              <a:defRPr sz="1600" b="1"/>
-            </a:pPr>
-            <a:r>
-              <a:t>Compliance Assessment</a:t>
-            </a:r>
-          </a:p>
-          <a:p>
-            <a:pPr>
-              <a:defRPr sz="1100"/>
-            </a:pPr>
-            <a:r>
-              <a:t>The crypto fund has a partial compliance level with an overall score of 44.83. Its KYC/AML framework has a coverage score of 32.78, indicating some gaps in procedures, particularly in Singapore and the US. The fund has registrations mentioned in Singapore, the US, and EU, but these are not confirmed. Significant compliance gaps include incomplete regulatory registrations in these jurisdictions and missing KYC/AML procedures. Notably, the fund lacks comprehensive KYC/AML procedures compliant with local requirements in Singapore and the US, such as risk-based approaches and customer identification measures.</a:t>
-            </a:r>
-          </a:p>
-        </p:txBody>
-      </p:sp>
+      </p:pic>
     </p:spTree>
   </p:cSld>
   <p:clrMapOvr>
@@ -8567,7 +8620,9 @@
         </p:nvSpPr>
         <p:spPr/>
         <p:txBody>
-          <a:bodyPr wrap="square" anchor="t"/>
+          <a:bodyPr wrap="square" anchor="t">
+            <a:noAutofit/>
+          </a:bodyPr>
           <a:lstStyle/>
           <a:p>
             <a:pPr>
@@ -8578,368 +8633,77 @@
               </a:defRPr>
             </a:pPr>
             <a:r>
-              <a:t>Regulatory Status by Jurisdiction</a:t>
+              <a:rPr sz="4800" dirty="0"/>
+              <a:t>Identified Compliance Gaps</a:t>
             </a:r>
           </a:p>
         </p:txBody>
       </p:sp>
-      <p:graphicFrame>
-        <p:nvGraphicFramePr>
-          <p:cNvPr id="3" name="Table 2"/>
-          <p:cNvGraphicFramePr>
-            <a:graphicFrameLocks noGrp="1"/>
-          </p:cNvGraphicFramePr>
+      <p:sp>
+        <p:nvSpPr>
+          <p:cNvPr id="3" name="TextBox 2"/>
+          <p:cNvSpPr txBox="1"/>
           <p:nvPr/>
-        </p:nvGraphicFramePr>
-        <p:xfrm>
-          <a:off x="457200" y="1188720"/>
-          <a:ext cx="11277600" cy="4754880"/>
-        </p:xfrm>
-        <a:graphic>
-          <a:graphicData uri="http://schemas.openxmlformats.org/drawingml/2006/table">
-            <a:tbl>
-              <a:tblPr firstRow="1" bandRow="1">
-                <a:tableStyleId>{5C22544A-7EE6-4342-B048-85BDC9FD1C3A}</a:tableStyleId>
-              </a:tblPr>
-              <a:tblGrid>
-                <a:gridCol w="3759200">
-                  <a:extLst>
-                    <a:ext uri="{9D8B030D-6E8A-4147-A177-3AD203B41FA5}">
-                      <a16:colId xmlns:a16="http://schemas.microsoft.com/office/drawing/2014/main" val="20000"/>
-                    </a:ext>
-                  </a:extLst>
-                </a:gridCol>
-                <a:gridCol w="3759200">
-                  <a:extLst>
-                    <a:ext uri="{9D8B030D-6E8A-4147-A177-3AD203B41FA5}">
-                      <a16:colId xmlns:a16="http://schemas.microsoft.com/office/drawing/2014/main" val="20001"/>
-                    </a:ext>
-                  </a:extLst>
-                </a:gridCol>
-                <a:gridCol w="3759200">
-                  <a:extLst>
-                    <a:ext uri="{9D8B030D-6E8A-4147-A177-3AD203B41FA5}">
-                      <a16:colId xmlns:a16="http://schemas.microsoft.com/office/drawing/2014/main" val="20002"/>
-                    </a:ext>
-                  </a:extLst>
-                </a:gridCol>
-              </a:tblGrid>
-              <a:tr h="1188720">
-                <a:tc>
-                  <a:txBody>
-                    <a:bodyPr/>
-                    <a:lstStyle/>
-                    <a:p>
-                      <a:pPr algn="l">
-                        <a:defRPr sz="1000" b="1">
-                          <a:solidFill>
-                            <a:srgbClr val="FFFFFF"/>
-                          </a:solidFill>
-                          <a:latin typeface="Segoe UI"/>
-                        </a:defRPr>
-                      </a:pPr>
-                      <a:r>
-                        <a:t>Jurisdiction</a:t>
-                      </a:r>
-                    </a:p>
-                  </a:txBody>
-                  <a:tcPr>
-                    <a:solidFill>
-                      <a:srgbClr val="E6E6E6"/>
-                    </a:solidFill>
-                  </a:tcPr>
-                </a:tc>
-                <a:tc>
-                  <a:txBody>
-                    <a:bodyPr/>
-                    <a:lstStyle/>
-                    <a:p>
-                      <a:pPr algn="l">
-                        <a:defRPr sz="1000" b="1">
-                          <a:solidFill>
-                            <a:srgbClr val="FFFFFF"/>
-                          </a:solidFill>
-                          <a:latin typeface="Segoe UI"/>
-                        </a:defRPr>
-                      </a:pPr>
-                      <a:r>
-                        <a:t>Status</a:t>
-                      </a:r>
-                    </a:p>
-                  </a:txBody>
-                  <a:tcPr>
-                    <a:solidFill>
-                      <a:srgbClr val="E6E6E6"/>
-                    </a:solidFill>
-                  </a:tcPr>
-                </a:tc>
-                <a:tc>
-                  <a:txBody>
-                    <a:bodyPr/>
-                    <a:lstStyle/>
-                    <a:p>
-                      <a:pPr algn="l">
-                        <a:defRPr sz="1000" b="1">
-                          <a:solidFill>
-                            <a:srgbClr val="FFFFFF"/>
-                          </a:solidFill>
-                          <a:latin typeface="Segoe UI"/>
-                        </a:defRPr>
-                      </a:pPr>
-                      <a:r>
-                        <a:t>Score</a:t>
-                      </a:r>
-                    </a:p>
-                  </a:txBody>
-                  <a:tcPr>
-                    <a:solidFill>
-                      <a:srgbClr val="E6E6E6"/>
-                    </a:solidFill>
-                  </a:tcPr>
-                </a:tc>
-                <a:extLst>
-                  <a:ext uri="{0D108BD9-81ED-4DB2-BD59-A6C34878D82A}">
-                    <a16:rowId xmlns:a16="http://schemas.microsoft.com/office/drawing/2014/main" val="10000"/>
-                  </a:ext>
-                </a:extLst>
-              </a:tr>
-              <a:tr h="1188720">
-                <a:tc>
-                  <a:txBody>
-                    <a:bodyPr/>
-                    <a:lstStyle/>
-                    <a:p>
-                      <a:pPr algn="l">
-                        <a:defRPr sz="1000" b="1">
-                          <a:solidFill>
-                            <a:srgbClr val="000000"/>
-                          </a:solidFill>
-                          <a:latin typeface="Segoe UI"/>
-                        </a:defRPr>
-                      </a:pPr>
-                      <a:r>
-                        <a:rPr dirty="0"/>
-                        <a:t>Singapore</a:t>
-                      </a:r>
-                    </a:p>
-                  </a:txBody>
-                  <a:tcPr>
-                    <a:solidFill>
-                      <a:srgbClr val="F5F5FA"/>
-                    </a:solidFill>
-                  </a:tcPr>
-                </a:tc>
-                <a:tc>
-                  <a:txBody>
-                    <a:bodyPr/>
-                    <a:lstStyle/>
-                    <a:p>
-                      <a:pPr algn="l">
-                        <a:defRPr sz="1000" b="0">
-                          <a:solidFill>
-                            <a:srgbClr val="000000"/>
-                          </a:solidFill>
-                          <a:latin typeface="Segoe UI"/>
-                        </a:defRPr>
-                      </a:pPr>
-                      <a:r>
-                        <a:t>Mentioned</a:t>
-                      </a:r>
-                    </a:p>
-                  </a:txBody>
-                  <a:tcPr>
-                    <a:solidFill>
-                      <a:srgbClr val="F5F5FA"/>
-                    </a:solidFill>
-                  </a:tcPr>
-                </a:tc>
-                <a:tc>
-                  <a:txBody>
-                    <a:bodyPr/>
-                    <a:lstStyle/>
-                    <a:p>
-                      <a:pPr algn="l">
-                        <a:defRPr sz="1000" b="0">
-                          <a:solidFill>
-                            <a:srgbClr val="000000"/>
-                          </a:solidFill>
-                          <a:latin typeface="Segoe UI"/>
-                        </a:defRPr>
-                      </a:pPr>
-                      <a:r>
-                        <a:t>40.0%</a:t>
-                      </a:r>
-                    </a:p>
-                  </a:txBody>
-                  <a:tcPr>
-                    <a:solidFill>
-                      <a:srgbClr val="F5F5FA"/>
-                    </a:solidFill>
-                  </a:tcPr>
-                </a:tc>
-                <a:extLst>
-                  <a:ext uri="{0D108BD9-81ED-4DB2-BD59-A6C34878D82A}">
-                    <a16:rowId xmlns:a16="http://schemas.microsoft.com/office/drawing/2014/main" val="10001"/>
-                  </a:ext>
-                </a:extLst>
-              </a:tr>
-              <a:tr h="1188720">
-                <a:tc>
-                  <a:txBody>
-                    <a:bodyPr/>
-                    <a:lstStyle/>
-                    <a:p>
-                      <a:pPr algn="l">
-                        <a:defRPr sz="1000" b="1">
-                          <a:solidFill>
-                            <a:srgbClr val="000000"/>
-                          </a:solidFill>
-                          <a:latin typeface="Segoe UI"/>
-                        </a:defRPr>
-                      </a:pPr>
-                      <a:r>
-                        <a:t>US</a:t>
-                      </a:r>
-                    </a:p>
-                  </a:txBody>
-                  <a:tcPr>
-                    <a:noFill/>
-                  </a:tcPr>
-                </a:tc>
-                <a:tc>
-                  <a:txBody>
-                    <a:bodyPr/>
-                    <a:lstStyle/>
-                    <a:p>
-                      <a:pPr algn="l">
-                        <a:defRPr sz="1000" b="0">
-                          <a:solidFill>
-                            <a:srgbClr val="000000"/>
-                          </a:solidFill>
-                          <a:latin typeface="Segoe UI"/>
-                        </a:defRPr>
-                      </a:pPr>
-                      <a:r>
-                        <a:t>Mentioned</a:t>
-                      </a:r>
-                    </a:p>
-                  </a:txBody>
-                  <a:tcPr>
-                    <a:noFill/>
-                  </a:tcPr>
-                </a:tc>
-                <a:tc>
-                  <a:txBody>
-                    <a:bodyPr/>
-                    <a:lstStyle/>
-                    <a:p>
-                      <a:pPr algn="l">
-                        <a:defRPr sz="1000" b="0">
-                          <a:solidFill>
-                            <a:srgbClr val="000000"/>
-                          </a:solidFill>
-                          <a:latin typeface="Segoe UI"/>
-                        </a:defRPr>
-                      </a:pPr>
-                      <a:r>
-                        <a:t>40.0%</a:t>
-                      </a:r>
-                    </a:p>
-                  </a:txBody>
-                  <a:tcPr>
-                    <a:noFill/>
-                  </a:tcPr>
-                </a:tc>
-                <a:extLst>
-                  <a:ext uri="{0D108BD9-81ED-4DB2-BD59-A6C34878D82A}">
-                    <a16:rowId xmlns:a16="http://schemas.microsoft.com/office/drawing/2014/main" val="10002"/>
-                  </a:ext>
-                </a:extLst>
-              </a:tr>
-              <a:tr h="1188720">
-                <a:tc>
-                  <a:txBody>
-                    <a:bodyPr/>
-                    <a:lstStyle/>
-                    <a:p>
-                      <a:pPr algn="l">
-                        <a:defRPr sz="1000" b="1">
-                          <a:solidFill>
-                            <a:srgbClr val="000000"/>
-                          </a:solidFill>
-                          <a:latin typeface="Segoe UI"/>
-                        </a:defRPr>
-                      </a:pPr>
-                      <a:r>
-                        <a:t>EU</a:t>
-                      </a:r>
-                    </a:p>
-                  </a:txBody>
-                  <a:tcPr>
-                    <a:solidFill>
-                      <a:srgbClr val="F5F5FA"/>
-                    </a:solidFill>
-                  </a:tcPr>
-                </a:tc>
-                <a:tc>
-                  <a:txBody>
-                    <a:bodyPr/>
-                    <a:lstStyle/>
-                    <a:p>
-                      <a:pPr algn="l">
-                        <a:defRPr sz="1000" b="0">
-                          <a:solidFill>
-                            <a:srgbClr val="000000"/>
-                          </a:solidFill>
-                          <a:latin typeface="Segoe UI"/>
-                        </a:defRPr>
-                      </a:pPr>
-                      <a:r>
-                        <a:t>Mentioned</a:t>
-                      </a:r>
-                    </a:p>
-                  </a:txBody>
-                  <a:tcPr>
-                    <a:solidFill>
-                      <a:srgbClr val="F5F5FA"/>
-                    </a:solidFill>
-                  </a:tcPr>
-                </a:tc>
-                <a:tc>
-                  <a:txBody>
-                    <a:bodyPr/>
-                    <a:lstStyle/>
-                    <a:p>
-                      <a:pPr algn="l">
-                        <a:defRPr sz="1000" b="0">
-                          <a:solidFill>
-                            <a:srgbClr val="000000"/>
-                          </a:solidFill>
-                          <a:latin typeface="Segoe UI"/>
-                        </a:defRPr>
-                      </a:pPr>
-                      <a:r>
-                        <a:rPr dirty="0"/>
-                        <a:t>40.0%</a:t>
-                      </a:r>
-                    </a:p>
-                  </a:txBody>
-                  <a:tcPr>
-                    <a:solidFill>
-                      <a:srgbClr val="F5F5FA"/>
-                    </a:solidFill>
-                  </a:tcPr>
-                </a:tc>
-                <a:extLst>
-                  <a:ext uri="{0D108BD9-81ED-4DB2-BD59-A6C34878D82A}">
-                    <a16:rowId xmlns:a16="http://schemas.microsoft.com/office/drawing/2014/main" val="10003"/>
-                  </a:ext>
-                </a:extLst>
-              </a:tr>
-            </a:tbl>
-          </a:graphicData>
-        </a:graphic>
-      </p:graphicFrame>
+        </p:nvSpPr>
+        <p:spPr>
+          <a:xfrm>
+            <a:off x="390088" y="1473945"/>
+            <a:ext cx="11277600" cy="2677656"/>
+          </a:xfrm>
+          <a:prstGeom prst="rect">
+            <a:avLst/>
+          </a:prstGeom>
+          <a:noFill/>
+        </p:spPr>
+        <p:txBody>
+          <a:bodyPr wrap="square" anchor="t">
+            <a:spAutoFit/>
+          </a:bodyPr>
+          <a:lstStyle/>
+          <a:p>
+            <a:r>
+              <a:rPr sz="2400" dirty="0"/>
+              <a:t>• Incomplete regulatory registration in Singapore</a:t>
+            </a:r>
+          </a:p>
+          <a:p>
+            <a:r>
+              <a:rPr sz="2400" dirty="0"/>
+              <a:t>• Incomplete regulatory registration in US</a:t>
+            </a:r>
+          </a:p>
+          <a:p>
+            <a:r>
+              <a:rPr sz="2400" dirty="0"/>
+              <a:t>• Incomplete regulatory registration in EU</a:t>
+            </a:r>
+          </a:p>
+          <a:p>
+            <a:r>
+              <a:rPr sz="2400" dirty="0"/>
+              <a:t>• Missing KYC/AML procedures for Singapore: Risk-based approach, CDD measures</a:t>
+            </a:r>
+          </a:p>
+          <a:p>
+            <a:r>
+              <a:rPr sz="2400" dirty="0"/>
+              <a:t>• Missing KYC/AML procedures for US: SAR filing, KYC verification, Customer identification</a:t>
+            </a:r>
+          </a:p>
+          <a:p>
+            <a:r>
+              <a:rPr sz="2400" dirty="0"/>
+              <a:t>• Missing KYC/AML procedures for EU: UBO registry, KYC/CDD procedures, PEP screening</a:t>
+            </a:r>
+          </a:p>
+          <a:p>
+            <a:r>
+              <a:rPr sz="2400" dirty="0"/>
+              <a:t>• Potential securities compliance gap for token offerings in US market</a:t>
+            </a:r>
+          </a:p>
+        </p:txBody>
+      </p:sp>
     </p:spTree>
   </p:cSld>
   <p:clrMapOvr>
@@ -8988,7 +8752,7 @@
               </a:defRPr>
             </a:pPr>
             <a:r>
-              <a:t>Identified Compliance Gaps</a:t>
+              <a:t>Conclusion &amp; Overall Assessment</a:t>
             </a:r>
           </a:p>
         </p:txBody>
@@ -9001,8 +8765,8 @@
         </p:nvSpPr>
         <p:spPr>
           <a:xfrm>
-            <a:off x="390088" y="1473945"/>
-            <a:ext cx="11277600" cy="5212080"/>
+            <a:off x="457200" y="1188720"/>
+            <a:ext cx="7585788" cy="4016484"/>
           </a:xfrm>
           <a:prstGeom prst="rect">
             <a:avLst/>
@@ -9015,38 +8779,86 @@
           </a:bodyPr>
           <a:lstStyle/>
           <a:p>
+            <a:pPr>
+              <a:defRPr sz="1200">
+                <a:solidFill>
+                  <a:srgbClr val="333333"/>
+                </a:solidFill>
+                <a:latin typeface="Segoe UI"/>
+              </a:defRPr>
+            </a:pPr>
+            <a:endParaRPr sz="2000" dirty="0"/>
+          </a:p>
+          <a:p>
+            <a:pPr>
+              <a:spcAft>
+                <a:spcPts val="600"/>
+              </a:spcAft>
+              <a:defRPr sz="1600" b="1"/>
+            </a:pPr>
             <a:r>
-              <a:t>• Incomplete regulatory registration in Singapore</a:t>
+              <a:rPr sz="2000" dirty="0"/>
+              <a:t>Overall Assessment: </a:t>
             </a:r>
           </a:p>
           <a:p>
+            <a:pPr>
+              <a:spcAft>
+                <a:spcPts val="1200"/>
+              </a:spcAft>
+              <a:defRPr sz="1200"/>
+            </a:pPr>
             <a:r>
-              <a:t>• Incomplete regulatory registration in US</a:t>
+              <a:rPr sz="2000" dirty="0"/>
+              <a:t>The Bitcoin Momentum Opportunities Fund presents a medium risk level and partial compliance level. Its most significant strength is its clear and concentrated investment strategy, while its most significant concern is the high portfolio asset concentration. The fund's overall profile raises caution due to significant regulatory gaps and high-risk factors. In conclusion, the Bitcoin Momentum Opportunities Fund requires caution, as its specialized approach and defined risk level are offset by notable concerns regarding asset concentration and incomplete regulatory registrations.</a:t>
             </a:r>
           </a:p>
           <a:p>
+            <a:pPr>
+              <a:spcAft>
+                <a:spcPts val="400"/>
+              </a:spcAft>
+              <a:defRPr sz="1200"/>
+            </a:pPr>
             <a:r>
-              <a:t>• Incomplete regulatory registration in EU</a:t>
+              <a:rPr sz="2000" b="1" dirty="0">
+                <a:solidFill>
+                  <a:schemeClr val="accent2">
+                    <a:lumMod val="75000"/>
+                  </a:schemeClr>
+                </a:solidFill>
+              </a:rPr>
+              <a:t>Risk: Medium (5</a:t>
             </a:r>
-          </a:p>
-          <a:p>
             <a:r>
-              <a:t>• Missing KYC/AML procedures for Singapore: Risk-based approach, CDD measures</a:t>
+              <a:rPr lang="fr-FR" sz="2000" b="1" dirty="0">
+                <a:solidFill>
+                  <a:schemeClr val="accent2">
+                    <a:lumMod val="75000"/>
+                  </a:schemeClr>
+                </a:solidFill>
+              </a:rPr>
+              <a:t>4</a:t>
             </a:r>
-          </a:p>
-          <a:p>
             <a:r>
-              <a:t>• Missing KYC/AML procedures for US: SAR filing, KYC verification, Customer identification</a:t>
+              <a:rPr sz="2000" b="1" dirty="0">
+                <a:solidFill>
+                  <a:schemeClr val="accent2">
+                    <a:lumMod val="75000"/>
+                  </a:schemeClr>
+                </a:solidFill>
+              </a:rPr>
+              <a:t>.0)</a:t>
             </a:r>
-          </a:p>
-          <a:p>
             <a:r>
-              <a:t>• Missing KYC/AML procedures for EU: UBO registry, KYC/CDD procedures, PEP screening</a:t>
-            </a:r>
-          </a:p>
-          <a:p>
-            <a:r>
-              <a:t>• Potential securities compliance gap for token offerings in US market</a:t>
+              <a:rPr sz="2000" dirty="0">
+                <a:solidFill>
+                  <a:schemeClr val="accent2">
+                    <a:lumMod val="75000"/>
+                  </a:schemeClr>
+                </a:solidFill>
+              </a:rPr>
+              <a:t>  |  </a:t>
             </a:r>
           </a:p>
         </p:txBody>

</xml_diff>